<commit_message>
Added link to software and data and made some other minor changes
</commit_message>
<xml_diff>
--- a/poster.pptx
+++ b/poster.pptx
@@ -197,7 +197,7 @@
           <a:p>
             <a:fld id="{1AD9D09F-343E-7D48-8732-1006C6EA2875}" type="datetimeFigureOut">
               <a:rPr lang="en-US" smtClean="0"/>
-              <a:t>8/5/16</a:t>
+              <a:t>8/6/16</a:t>
             </a:fld>
             <a:endParaRPr lang="en-US"/>
           </a:p>
@@ -680,7 +680,7 @@
           <a:p>
             <a:fld id="{45965E25-EFEF-4749-882C-F301310EA604}" type="datetimeFigureOut">
               <a:rPr lang="en-US" smtClean="0"/>
-              <a:t>8/5/16</a:t>
+              <a:t>8/6/16</a:t>
             </a:fld>
             <a:endParaRPr lang="en-US"/>
           </a:p>
@@ -850,7 +850,7 @@
           <a:p>
             <a:fld id="{45965E25-EFEF-4749-882C-F301310EA604}" type="datetimeFigureOut">
               <a:rPr lang="en-US" smtClean="0"/>
-              <a:t>8/5/16</a:t>
+              <a:t>8/6/16</a:t>
             </a:fld>
             <a:endParaRPr lang="en-US"/>
           </a:p>
@@ -1030,7 +1030,7 @@
           <a:p>
             <a:fld id="{45965E25-EFEF-4749-882C-F301310EA604}" type="datetimeFigureOut">
               <a:rPr lang="en-US" smtClean="0"/>
-              <a:t>8/5/16</a:t>
+              <a:t>8/6/16</a:t>
             </a:fld>
             <a:endParaRPr lang="en-US"/>
           </a:p>
@@ -1200,7 +1200,7 @@
           <a:p>
             <a:fld id="{45965E25-EFEF-4749-882C-F301310EA604}" type="datetimeFigureOut">
               <a:rPr lang="en-US" smtClean="0"/>
-              <a:t>8/5/16</a:t>
+              <a:t>8/6/16</a:t>
             </a:fld>
             <a:endParaRPr lang="en-US"/>
           </a:p>
@@ -1444,7 +1444,7 @@
           <a:p>
             <a:fld id="{45965E25-EFEF-4749-882C-F301310EA604}" type="datetimeFigureOut">
               <a:rPr lang="en-US" smtClean="0"/>
-              <a:t>8/5/16</a:t>
+              <a:t>8/6/16</a:t>
             </a:fld>
             <a:endParaRPr lang="en-US"/>
           </a:p>
@@ -1676,7 +1676,7 @@
           <a:p>
             <a:fld id="{45965E25-EFEF-4749-882C-F301310EA604}" type="datetimeFigureOut">
               <a:rPr lang="en-US" smtClean="0"/>
-              <a:t>8/5/16</a:t>
+              <a:t>8/6/16</a:t>
             </a:fld>
             <a:endParaRPr lang="en-US"/>
           </a:p>
@@ -2043,7 +2043,7 @@
           <a:p>
             <a:fld id="{45965E25-EFEF-4749-882C-F301310EA604}" type="datetimeFigureOut">
               <a:rPr lang="en-US" smtClean="0"/>
-              <a:t>8/5/16</a:t>
+              <a:t>8/6/16</a:t>
             </a:fld>
             <a:endParaRPr lang="en-US"/>
           </a:p>
@@ -2161,7 +2161,7 @@
           <a:p>
             <a:fld id="{45965E25-EFEF-4749-882C-F301310EA604}" type="datetimeFigureOut">
               <a:rPr lang="en-US" smtClean="0"/>
-              <a:t>8/5/16</a:t>
+              <a:t>8/6/16</a:t>
             </a:fld>
             <a:endParaRPr lang="en-US"/>
           </a:p>
@@ -2256,7 +2256,7 @@
           <a:p>
             <a:fld id="{45965E25-EFEF-4749-882C-F301310EA604}" type="datetimeFigureOut">
               <a:rPr lang="en-US" smtClean="0"/>
-              <a:t>8/5/16</a:t>
+              <a:t>8/6/16</a:t>
             </a:fld>
             <a:endParaRPr lang="en-US"/>
           </a:p>
@@ -2533,7 +2533,7 @@
           <a:p>
             <a:fld id="{45965E25-EFEF-4749-882C-F301310EA604}" type="datetimeFigureOut">
               <a:rPr lang="en-US" smtClean="0"/>
-              <a:t>8/5/16</a:t>
+              <a:t>8/6/16</a:t>
             </a:fld>
             <a:endParaRPr lang="en-US"/>
           </a:p>
@@ -2790,7 +2790,7 @@
           <a:p>
             <a:fld id="{45965E25-EFEF-4749-882C-F301310EA604}" type="datetimeFigureOut">
               <a:rPr lang="en-US" smtClean="0"/>
-              <a:t>8/5/16</a:t>
+              <a:t>8/6/16</a:t>
             </a:fld>
             <a:endParaRPr lang="en-US"/>
           </a:p>
@@ -3003,7 +3003,7 @@
           <a:p>
             <a:fld id="{45965E25-EFEF-4749-882C-F301310EA604}" type="datetimeFigureOut">
               <a:rPr lang="en-US" smtClean="0"/>
-              <a:t>8/5/16</a:t>
+              <a:t>8/6/16</a:t>
             </a:fld>
             <a:endParaRPr lang="en-US"/>
           </a:p>
@@ -3427,7 +3427,7 @@
         </p:nvSpPr>
         <p:spPr>
           <a:xfrm>
-            <a:off x="10636124" y="34787574"/>
+            <a:off x="10636124" y="35244774"/>
             <a:ext cx="6457553" cy="6663484"/>
           </a:xfrm>
           <a:prstGeom prst="rect">
@@ -3479,7 +3479,7 @@
         </p:nvSpPr>
         <p:spPr>
           <a:xfrm>
-            <a:off x="19968296" y="4459666"/>
+            <a:off x="19968296" y="4916866"/>
             <a:ext cx="9917552" cy="14115069"/>
           </a:xfrm>
           <a:prstGeom prst="rect">
@@ -3534,7 +3534,7 @@
         </p:nvSpPr>
         <p:spPr>
           <a:xfrm>
-            <a:off x="20068724" y="17934911"/>
+            <a:off x="20068724" y="18392111"/>
             <a:ext cx="8956530" cy="4885510"/>
           </a:xfrm>
           <a:prstGeom prst="rect">
@@ -3582,7 +3582,7 @@
         </p:nvSpPr>
         <p:spPr>
           <a:xfrm>
-            <a:off x="16927679" y="22561549"/>
+            <a:off x="16927679" y="23018749"/>
             <a:ext cx="13104000" cy="18360000"/>
           </a:xfrm>
           <a:prstGeom prst="rect">
@@ -3630,7 +3630,7 @@
         </p:nvSpPr>
         <p:spPr>
           <a:xfrm>
-            <a:off x="1096120" y="29130487"/>
+            <a:off x="1096120" y="29587687"/>
             <a:ext cx="9699907" cy="11216901"/>
           </a:xfrm>
           <a:prstGeom prst="rect">
@@ -3685,7 +3685,7 @@
         </p:nvSpPr>
         <p:spPr>
           <a:xfrm>
-            <a:off x="541656" y="19787004"/>
+            <a:off x="541656" y="20244204"/>
             <a:ext cx="10059386" cy="6426092"/>
           </a:xfrm>
           <a:prstGeom prst="rect">
@@ -3740,7 +3740,7 @@
         </p:nvSpPr>
         <p:spPr>
           <a:xfrm>
-            <a:off x="1821195" y="25637602"/>
+            <a:off x="1821195" y="26094802"/>
             <a:ext cx="8634697" cy="3930637"/>
           </a:xfrm>
           <a:prstGeom prst="rect">
@@ -3792,7 +3792,7 @@
         </p:nvSpPr>
         <p:spPr>
           <a:xfrm>
-            <a:off x="1479937" y="13998383"/>
+            <a:off x="1479937" y="14455583"/>
             <a:ext cx="9461324" cy="5993909"/>
           </a:xfrm>
           <a:prstGeom prst="rect">
@@ -3840,7 +3840,7 @@
         </p:nvSpPr>
         <p:spPr>
           <a:xfrm>
-            <a:off x="1123042" y="4888906"/>
+            <a:off x="1123042" y="5346106"/>
             <a:ext cx="9461324" cy="9361393"/>
           </a:xfrm>
           <a:prstGeom prst="rect">
@@ -3888,7 +3888,7 @@
         </p:nvSpPr>
         <p:spPr>
           <a:xfrm>
-            <a:off x="10454496" y="3817842"/>
+            <a:off x="10454496" y="4275042"/>
             <a:ext cx="9853245" cy="31112238"/>
           </a:xfrm>
           <a:prstGeom prst="rect">
@@ -3938,7 +3938,7 @@
         </p:nvSpPr>
         <p:spPr>
           <a:xfrm>
-            <a:off x="10613206" y="5073859"/>
+            <a:off x="10613206" y="5531059"/>
             <a:ext cx="720000" cy="720000"/>
           </a:xfrm>
           <a:prstGeom prst="ellipse">
@@ -3985,7 +3985,7 @@
         <p:spPr>
           <a:xfrm>
             <a:off x="0" y="0"/>
-            <a:ext cx="30275213" cy="4031645"/>
+            <a:ext cx="30275213" cy="4451901"/>
           </a:xfrm>
           <a:prstGeom prst="rect">
             <a:avLst/>
@@ -4028,8 +4028,8 @@
         </p:nvSpPr>
         <p:spPr>
           <a:xfrm>
-            <a:off x="930580" y="164805"/>
-            <a:ext cx="28437592" cy="2554545"/>
+            <a:off x="624828" y="42885"/>
+            <a:ext cx="29030783" cy="2800767"/>
           </a:xfrm>
           <a:prstGeom prst="rect">
             <a:avLst/>
@@ -4037,14 +4037,14 @@
           <a:noFill/>
         </p:spPr>
         <p:txBody>
-          <a:bodyPr wrap="none" rtlCol="0">
+          <a:bodyPr wrap="square" rtlCol="0">
             <a:spAutoFit/>
           </a:bodyPr>
           <a:lstStyle/>
           <a:p>
             <a:pPr algn="ctr"/>
             <a:r>
-              <a:rPr lang="en-US" sz="8000" b="1" dirty="0" smtClean="0">
+              <a:rPr lang="en-US" sz="8800" b="1" dirty="0" smtClean="0">
                 <a:solidFill>
                   <a:srgbClr val="FFFDAD"/>
                 </a:solidFill>
@@ -4052,13 +4052,10 @@
                 <a:ea typeface="Candara" charset="0"/>
                 <a:cs typeface="Candara" charset="0"/>
               </a:rPr>
-              <a:t>The More Antecedents, the Merrier: Resolving Multi-Antecedent</a:t>
-            </a:r>
-          </a:p>
-          <a:p>
-            <a:pPr algn="ctr"/>
-            <a:r>
-              <a:rPr lang="en-US" sz="8000" b="1" dirty="0" smtClean="0">
+              <a:t>The More Antecedents, the Merrier: </a:t>
+            </a:r>
+            <a:r>
+              <a:rPr lang="en-US" sz="8800" b="1" dirty="0" smtClean="0">
                 <a:solidFill>
                   <a:srgbClr val="FFFDAD"/>
                 </a:solidFill>
@@ -4066,9 +4063,23 @@
                 <a:ea typeface="Candara" charset="0"/>
                 <a:cs typeface="Candara" charset="0"/>
               </a:rPr>
-              <a:t>Anaphors</a:t>
-            </a:r>
-            <a:endParaRPr lang="en-US" sz="8000" b="1" dirty="0">
+              <a:t>Resolving</a:t>
+            </a:r>
+          </a:p>
+          <a:p>
+            <a:pPr algn="ctr"/>
+            <a:r>
+              <a:rPr lang="en-US" sz="8800" b="1" dirty="0" smtClean="0">
+                <a:solidFill>
+                  <a:srgbClr val="FFFDAD"/>
+                </a:solidFill>
+                <a:latin typeface="Candara" charset="0"/>
+                <a:ea typeface="Candara" charset="0"/>
+                <a:cs typeface="Candara" charset="0"/>
+              </a:rPr>
+              <a:t>Multi-Antecedent Anaphors</a:t>
+            </a:r>
+            <a:endParaRPr lang="en-US" sz="8800" b="1" dirty="0">
               <a:solidFill>
                 <a:srgbClr val="FFFDAD"/>
               </a:solidFill>
@@ -4087,8 +4098,8 @@
         </p:nvSpPr>
         <p:spPr>
           <a:xfrm>
-            <a:off x="591563" y="2139495"/>
-            <a:ext cx="9414052" cy="769441"/>
+            <a:off x="591563" y="2779575"/>
+            <a:ext cx="8581003" cy="707886"/>
           </a:xfrm>
           <a:prstGeom prst="rect">
             <a:avLst/>
@@ -4102,7 +4113,7 @@
           <a:lstStyle/>
           <a:p>
             <a:r>
-              <a:rPr lang="en-US" sz="4400" b="1" dirty="0" err="1" smtClean="0">
+              <a:rPr lang="en-US" sz="4000" b="1" dirty="0" err="1" smtClean="0">
                 <a:solidFill>
                   <a:srgbClr val="FFFDAD"/>
                 </a:solidFill>
@@ -4112,7 +4123,7 @@
               <a:t>Hardik</a:t>
             </a:r>
             <a:r>
-              <a:rPr lang="en-US" sz="4400" b="1" dirty="0" smtClean="0">
+              <a:rPr lang="en-US" sz="4000" b="1" dirty="0" smtClean="0">
                 <a:solidFill>
                   <a:srgbClr val="FFFDAD"/>
                 </a:solidFill>
@@ -4122,7 +4133,7 @@
               <a:t> </a:t>
             </a:r>
             <a:r>
-              <a:rPr lang="en-US" sz="4400" b="1" dirty="0" err="1" smtClean="0">
+              <a:rPr lang="en-US" sz="4000" b="1" dirty="0" err="1" smtClean="0">
                 <a:solidFill>
                   <a:srgbClr val="FFFDAD"/>
                 </a:solidFill>
@@ -4132,7 +4143,7 @@
               <a:t>Vala</a:t>
             </a:r>
             <a:r>
-              <a:rPr lang="en-US" sz="4400" b="1" dirty="0" smtClean="0">
+              <a:rPr lang="en-US" sz="4000" b="1" dirty="0" smtClean="0">
                 <a:solidFill>
                   <a:srgbClr val="FFFDAD"/>
                 </a:solidFill>
@@ -4142,7 +4153,7 @@
               <a:t>, Andrew Piper, Derek </a:t>
             </a:r>
             <a:r>
-              <a:rPr lang="en-US" sz="4400" b="1" dirty="0" err="1" smtClean="0">
+              <a:rPr lang="en-US" sz="4000" b="1" dirty="0" err="1" smtClean="0">
                 <a:solidFill>
                   <a:srgbClr val="FFFDAD"/>
                 </a:solidFill>
@@ -4151,7 +4162,7 @@
               </a:rPr>
               <a:t>Ruths</a:t>
             </a:r>
-            <a:endParaRPr lang="en-US" sz="4400" b="1" dirty="0">
+            <a:endParaRPr lang="en-US" sz="4000" b="1" dirty="0">
               <a:solidFill>
                 <a:srgbClr val="FFFDAD"/>
               </a:solidFill>
@@ -4169,8 +4180,8 @@
         </p:nvSpPr>
         <p:spPr>
           <a:xfrm>
-            <a:off x="624829" y="2908936"/>
-            <a:ext cx="15745208" cy="769441"/>
+            <a:off x="594349" y="3427096"/>
+            <a:ext cx="14349377" cy="707886"/>
           </a:xfrm>
           <a:prstGeom prst="rect">
             <a:avLst/>
@@ -4184,7 +4195,7 @@
           <a:lstStyle/>
           <a:p>
             <a:r>
-              <a:rPr lang="en-US" sz="4400" b="1" dirty="0" err="1" smtClean="0">
+              <a:rPr lang="en-US" sz="4000" b="1" dirty="0" err="1" smtClean="0">
                 <a:solidFill>
                   <a:srgbClr val="FFFDAD"/>
                 </a:solidFill>
@@ -4194,7 +4205,7 @@
               <a:t>hardik.vala@mail.mcgill.ca</a:t>
             </a:r>
             <a:r>
-              <a:rPr lang="en-US" sz="4400" b="1" dirty="0" smtClean="0">
+              <a:rPr lang="en-US" sz="4000" b="1" dirty="0" smtClean="0">
                 <a:solidFill>
                   <a:srgbClr val="FFFDAD"/>
                 </a:solidFill>
@@ -4204,7 +4215,7 @@
               <a:t>, {</a:t>
             </a:r>
             <a:r>
-              <a:rPr lang="en-US" sz="4400" b="1" dirty="0" err="1" smtClean="0">
+              <a:rPr lang="en-US" sz="4000" b="1" dirty="0" err="1" smtClean="0">
                 <a:solidFill>
                   <a:srgbClr val="FFFDAD"/>
                 </a:solidFill>
@@ -4214,7 +4225,7 @@
               <a:t>andrew.piper</a:t>
             </a:r>
             <a:r>
-              <a:rPr lang="en-US" sz="4400" b="1" dirty="0" smtClean="0">
+              <a:rPr lang="en-US" sz="4000" b="1" dirty="0" smtClean="0">
                 <a:solidFill>
                   <a:srgbClr val="FFFDAD"/>
                 </a:solidFill>
@@ -4224,7 +4235,7 @@
               <a:t>, </a:t>
             </a:r>
             <a:r>
-              <a:rPr lang="en-US" sz="4400" b="1" dirty="0" err="1" smtClean="0">
+              <a:rPr lang="en-US" sz="4000" b="1" dirty="0" err="1" smtClean="0">
                 <a:solidFill>
                   <a:srgbClr val="FFFDAD"/>
                 </a:solidFill>
@@ -4234,7 +4245,7 @@
               <a:t>derek.ruths</a:t>
             </a:r>
             <a:r>
-              <a:rPr lang="en-US" sz="4400" b="1" dirty="0" smtClean="0">
+              <a:rPr lang="en-US" sz="4000" b="1" dirty="0" smtClean="0">
                 <a:solidFill>
                   <a:srgbClr val="FFFDAD"/>
                 </a:solidFill>
@@ -4244,7 +4255,7 @@
               <a:t>}@</a:t>
             </a:r>
             <a:r>
-              <a:rPr lang="en-US" sz="4400" b="1" dirty="0" err="1" smtClean="0">
+              <a:rPr lang="en-US" sz="4000" b="1" dirty="0" err="1" smtClean="0">
                 <a:solidFill>
                   <a:srgbClr val="FFFDAD"/>
                 </a:solidFill>
@@ -4253,7 +4264,7 @@
               </a:rPr>
               <a:t>mcgill.ca</a:t>
             </a:r>
-            <a:endParaRPr lang="en-US" sz="4400" b="1" dirty="0">
+            <a:endParaRPr lang="en-US" sz="4000" b="1" dirty="0">
               <a:solidFill>
                 <a:srgbClr val="FFFDAD"/>
               </a:solidFill>
@@ -4271,7 +4282,7 @@
         </p:nvSpPr>
         <p:spPr>
           <a:xfrm>
-            <a:off x="12999191" y="4039989"/>
+            <a:off x="12999191" y="4497189"/>
             <a:ext cx="4595611" cy="1015663"/>
           </a:xfrm>
           <a:prstGeom prst="rect">
@@ -4304,8 +4315,8 @@
         </p:nvSpPr>
         <p:spPr>
           <a:xfrm>
-            <a:off x="0" y="41862631"/>
-            <a:ext cx="30275213" cy="950059"/>
+            <a:off x="0" y="42061262"/>
+            <a:ext cx="30275213" cy="720000"/>
           </a:xfrm>
           <a:prstGeom prst="rect">
             <a:avLst/>
@@ -4348,7 +4359,7 @@
         </p:nvSpPr>
         <p:spPr>
           <a:xfrm>
-            <a:off x="27315611" y="1439544"/>
+            <a:off x="27315611" y="1713864"/>
             <a:ext cx="2340000" cy="2340000"/>
           </a:xfrm>
           <a:prstGeom prst="ellipse">
@@ -4408,7 +4419,7 @@
         </p:blipFill>
         <p:spPr>
           <a:xfrm>
-            <a:off x="27474109" y="1406249"/>
+            <a:off x="27474109" y="1680569"/>
             <a:ext cx="1980000" cy="1980000"/>
           </a:xfrm>
           <a:prstGeom prst="rect">
@@ -4424,7 +4435,7 @@
         </p:nvSpPr>
         <p:spPr>
           <a:xfrm>
-            <a:off x="24587853" y="1463607"/>
+            <a:off x="24587853" y="1737927"/>
             <a:ext cx="2340000" cy="2340000"/>
           </a:xfrm>
           <a:prstGeom prst="ellipse">
@@ -4484,7 +4495,7 @@
         </p:blipFill>
         <p:spPr>
           <a:xfrm>
-            <a:off x="24650935" y="2037060"/>
+            <a:off x="24650935" y="2311380"/>
             <a:ext cx="2253104" cy="1188000"/>
           </a:xfrm>
           <a:prstGeom prst="rect">
@@ -4500,7 +4511,7 @@
         </p:nvSpPr>
         <p:spPr>
           <a:xfrm>
-            <a:off x="10096271" y="5106905"/>
+            <a:off x="10096271" y="5564105"/>
             <a:ext cx="1779073" cy="646331"/>
           </a:xfrm>
           <a:prstGeom prst="rect">
@@ -4533,7 +4544,7 @@
         </p:nvSpPr>
         <p:spPr>
           <a:xfrm>
-            <a:off x="10666744" y="28373433"/>
+            <a:off x="10666744" y="28830633"/>
             <a:ext cx="792000" cy="504000"/>
           </a:xfrm>
           <a:prstGeom prst="rect">
@@ -4579,7 +4590,7 @@
         </p:nvSpPr>
         <p:spPr>
           <a:xfrm>
-            <a:off x="10811586" y="5165585"/>
+            <a:off x="10811586" y="5622785"/>
             <a:ext cx="5632836" cy="523220"/>
           </a:xfrm>
           <a:prstGeom prst="rect">
@@ -4612,7 +4623,7 @@
         </p:nvSpPr>
         <p:spPr>
           <a:xfrm>
-            <a:off x="11450526" y="7923164"/>
+            <a:off x="11450526" y="8380364"/>
             <a:ext cx="3423142" cy="523220"/>
           </a:xfrm>
           <a:prstGeom prst="rect">
@@ -4665,7 +4676,7 @@
         </p:nvSpPr>
         <p:spPr>
           <a:xfrm>
-            <a:off x="16466701" y="7734503"/>
+            <a:off x="16466701" y="8191703"/>
             <a:ext cx="3423142" cy="523220"/>
           </a:xfrm>
           <a:prstGeom prst="rect">
@@ -4710,7 +4721,7 @@
         </p:nvSpPr>
         <p:spPr>
           <a:xfrm>
-            <a:off x="10605645" y="8554882"/>
+            <a:off x="10605645" y="9012082"/>
             <a:ext cx="720000" cy="720000"/>
           </a:xfrm>
           <a:prstGeom prst="ellipse">
@@ -4756,7 +4767,7 @@
         </p:nvSpPr>
         <p:spPr>
           <a:xfrm>
-            <a:off x="10088710" y="8587928"/>
+            <a:off x="10088710" y="9045128"/>
             <a:ext cx="1779073" cy="646331"/>
           </a:xfrm>
           <a:prstGeom prst="rect">
@@ -4789,7 +4800,7 @@
         </p:nvSpPr>
         <p:spPr>
           <a:xfrm>
-            <a:off x="11406577" y="8647638"/>
+            <a:off x="11406577" y="9104838"/>
             <a:ext cx="8775874" cy="954107"/>
           </a:xfrm>
           <a:prstGeom prst="rect">
@@ -4842,7 +4853,7 @@
         </p:nvSpPr>
         <p:spPr>
           <a:xfrm>
-            <a:off x="10574576" y="9642982"/>
+            <a:off x="10574576" y="10100182"/>
             <a:ext cx="4625829" cy="1631216"/>
           </a:xfrm>
           <a:prstGeom prst="rect">
@@ -4874,7 +4885,7 @@
         </p:nvSpPr>
         <p:spPr>
           <a:xfrm>
-            <a:off x="15200404" y="9639766"/>
+            <a:off x="15200404" y="10096966"/>
             <a:ext cx="4867443" cy="1631216"/>
           </a:xfrm>
           <a:prstGeom prst="rect">
@@ -4920,7 +4931,7 @@
         </p:nvCxnSpPr>
         <p:spPr>
           <a:xfrm flipH="1">
-            <a:off x="14432310" y="9528592"/>
+            <a:off x="14432310" y="9985792"/>
             <a:ext cx="108000" cy="180000"/>
           </a:xfrm>
           <a:prstGeom prst="line">
@@ -4955,7 +4966,7 @@
         </p:nvCxnSpPr>
         <p:spPr>
           <a:xfrm>
-            <a:off x="14893878" y="9552976"/>
+            <a:off x="14893878" y="10010176"/>
             <a:ext cx="324813" cy="173904"/>
           </a:xfrm>
           <a:prstGeom prst="line">
@@ -4990,7 +5001,7 @@
         </p:nvCxnSpPr>
         <p:spPr>
           <a:xfrm flipH="1" flipV="1">
-            <a:off x="11521775" y="12563856"/>
+            <a:off x="11521775" y="13021056"/>
             <a:ext cx="0" cy="1080000"/>
           </a:xfrm>
           <a:prstGeom prst="line">
@@ -5026,7 +5037,7 @@
         </p:nvCxnSpPr>
         <p:spPr>
           <a:xfrm flipH="1" flipV="1">
-            <a:off x="13068236" y="12557817"/>
+            <a:off x="13068236" y="13015017"/>
             <a:ext cx="0" cy="648000"/>
           </a:xfrm>
           <a:prstGeom prst="line">
@@ -5062,7 +5073,7 @@
         </p:nvCxnSpPr>
         <p:spPr>
           <a:xfrm flipH="1">
-            <a:off x="11509126" y="12557874"/>
+            <a:off x="11509126" y="13015074"/>
             <a:ext cx="1584000" cy="0"/>
           </a:xfrm>
           <a:prstGeom prst="line">
@@ -5098,7 +5109,7 @@
         </p:nvCxnSpPr>
         <p:spPr>
           <a:xfrm flipH="1" flipV="1">
-            <a:off x="18317685" y="12174691"/>
+            <a:off x="18317685" y="12631891"/>
             <a:ext cx="0" cy="1908000"/>
           </a:xfrm>
           <a:prstGeom prst="line">
@@ -5134,7 +5145,7 @@
         </p:nvCxnSpPr>
         <p:spPr>
           <a:xfrm flipH="1">
-            <a:off x="18306288" y="12155481"/>
+            <a:off x="18306288" y="12612681"/>
             <a:ext cx="612000" cy="0"/>
           </a:xfrm>
           <a:prstGeom prst="line">
@@ -5170,7 +5181,7 @@
         </p:nvCxnSpPr>
         <p:spPr>
           <a:xfrm flipV="1">
-            <a:off x="18594686" y="11563191"/>
+            <a:off x="18594686" y="12020391"/>
             <a:ext cx="0" cy="540000"/>
           </a:xfrm>
           <a:prstGeom prst="line">
@@ -5206,7 +5217,7 @@
         </p:nvCxnSpPr>
         <p:spPr>
           <a:xfrm flipH="1">
-            <a:off x="12287731" y="11581480"/>
+            <a:off x="12287731" y="12038680"/>
             <a:ext cx="6336000" cy="0"/>
           </a:xfrm>
           <a:prstGeom prst="line">
@@ -5242,7 +5253,7 @@
         </p:nvCxnSpPr>
         <p:spPr>
           <a:xfrm flipV="1">
-            <a:off x="12282838" y="11501018"/>
+            <a:off x="12282838" y="11958218"/>
             <a:ext cx="0" cy="972000"/>
           </a:xfrm>
           <a:prstGeom prst="line">
@@ -5280,7 +5291,7 @@
         </p:nvSpPr>
         <p:spPr>
           <a:xfrm>
-            <a:off x="12178582" y="12445082"/>
+            <a:off x="12178582" y="12902282"/>
             <a:ext cx="216000" cy="216000"/>
           </a:xfrm>
           <a:prstGeom prst="ellipse">
@@ -5328,7 +5339,7 @@
         </p:nvSpPr>
         <p:spPr>
           <a:xfrm>
-            <a:off x="18500134" y="12054938"/>
+            <a:off x="18500134" y="12512138"/>
             <a:ext cx="216000" cy="216000"/>
           </a:xfrm>
           <a:prstGeom prst="ellipse">
@@ -5376,7 +5387,7 @@
         </p:nvSpPr>
         <p:spPr>
           <a:xfrm>
-            <a:off x="15356639" y="11475208"/>
+            <a:off x="15356639" y="11932408"/>
             <a:ext cx="216000" cy="216000"/>
           </a:xfrm>
           <a:prstGeom prst="ellipse">
@@ -5422,7 +5433,7 @@
         </p:nvGrpSpPr>
         <p:grpSpPr>
           <a:xfrm>
-            <a:off x="19232063" y="11314999"/>
+            <a:off x="19232063" y="11772199"/>
             <a:ext cx="186096" cy="1980000"/>
             <a:chOff x="10707954" y="11366486"/>
             <a:chExt cx="186096" cy="2646865"/>
@@ -5542,7 +5553,7 @@
         </p:nvSpPr>
         <p:spPr>
           <a:xfrm>
-            <a:off x="19403847" y="13116282"/>
+            <a:off x="19403847" y="13573482"/>
             <a:ext cx="456105" cy="344958"/>
           </a:xfrm>
           <a:prstGeom prst="rect">
@@ -5575,7 +5586,7 @@
         </p:nvSpPr>
         <p:spPr>
           <a:xfrm>
-            <a:off x="19409943" y="11147274"/>
+            <a:off x="19409943" y="11604474"/>
             <a:ext cx="456105" cy="338554"/>
           </a:xfrm>
           <a:prstGeom prst="rect">
@@ -5617,7 +5628,7 @@
         </p:nvSpPr>
         <p:spPr>
           <a:xfrm>
-            <a:off x="10593453" y="15126370"/>
+            <a:off x="10593453" y="15583570"/>
             <a:ext cx="720000" cy="720000"/>
           </a:xfrm>
           <a:prstGeom prst="ellipse">
@@ -5663,7 +5674,7 @@
         </p:nvSpPr>
         <p:spPr>
           <a:xfrm>
-            <a:off x="10076518" y="15141128"/>
+            <a:off x="10076518" y="15598328"/>
             <a:ext cx="1779073" cy="646331"/>
           </a:xfrm>
           <a:prstGeom prst="rect">
@@ -5696,7 +5707,7 @@
         </p:nvSpPr>
         <p:spPr>
           <a:xfrm>
-            <a:off x="11394385" y="15219126"/>
+            <a:off x="11394385" y="15676326"/>
             <a:ext cx="8775874" cy="954107"/>
           </a:xfrm>
           <a:prstGeom prst="rect">
@@ -5742,7 +5753,7 @@
         </p:nvSpPr>
         <p:spPr>
           <a:xfrm>
-            <a:off x="10630029" y="5817748"/>
+            <a:off x="10630029" y="6274948"/>
             <a:ext cx="9444791" cy="2246769"/>
           </a:xfrm>
           <a:prstGeom prst="rect">
@@ -5881,7 +5892,7 @@
         </p:nvGrpSpPr>
         <p:grpSpPr>
           <a:xfrm>
-            <a:off x="11521775" y="6277593"/>
+            <a:off x="11521775" y="6734793"/>
             <a:ext cx="7788323" cy="1531001"/>
             <a:chOff x="11521775" y="6277593"/>
             <a:chExt cx="7788323" cy="1531001"/>
@@ -6110,7 +6121,7 @@
         </p:nvSpPr>
         <p:spPr>
           <a:xfrm>
-            <a:off x="10617837" y="13175620"/>
+            <a:off x="10617837" y="13632820"/>
             <a:ext cx="9444791" cy="1815882"/>
           </a:xfrm>
           <a:prstGeom prst="rect">
@@ -6247,7 +6258,7 @@
         </p:nvCxnSpPr>
         <p:spPr>
           <a:xfrm flipH="1" flipV="1">
-            <a:off x="18908997" y="12180787"/>
+            <a:off x="18908997" y="12637987"/>
             <a:ext cx="0" cy="1476000"/>
           </a:xfrm>
           <a:prstGeom prst="line">
@@ -6283,7 +6294,7 @@
         </p:nvCxnSpPr>
         <p:spPr>
           <a:xfrm flipH="1" flipV="1">
-            <a:off x="11527871" y="19665696"/>
+            <a:off x="11527871" y="20122896"/>
             <a:ext cx="0" cy="1080000"/>
           </a:xfrm>
           <a:prstGeom prst="line">
@@ -6319,7 +6330,7 @@
         </p:nvCxnSpPr>
         <p:spPr>
           <a:xfrm flipH="1" flipV="1">
-            <a:off x="13074332" y="19659657"/>
+            <a:off x="13074332" y="20116857"/>
             <a:ext cx="0" cy="648000"/>
           </a:xfrm>
           <a:prstGeom prst="line">
@@ -6355,7 +6366,7 @@
         </p:nvCxnSpPr>
         <p:spPr>
           <a:xfrm flipH="1">
-            <a:off x="11515222" y="19659714"/>
+            <a:off x="11515222" y="20116914"/>
             <a:ext cx="1584000" cy="0"/>
           </a:xfrm>
           <a:prstGeom prst="line">
@@ -6391,7 +6402,7 @@
         </p:nvCxnSpPr>
         <p:spPr>
           <a:xfrm flipH="1" flipV="1">
-            <a:off x="18323781" y="19276531"/>
+            <a:off x="18323781" y="19733731"/>
             <a:ext cx="0" cy="1908000"/>
           </a:xfrm>
           <a:prstGeom prst="line">
@@ -6429,7 +6440,7 @@
         </p:nvCxnSpPr>
         <p:spPr>
           <a:xfrm flipH="1">
-            <a:off x="19051509" y="18749378"/>
+            <a:off x="19051509" y="19206578"/>
             <a:ext cx="612000" cy="0"/>
           </a:xfrm>
           <a:prstGeom prst="line">
@@ -6467,7 +6478,7 @@
         </p:nvCxnSpPr>
         <p:spPr>
           <a:xfrm flipV="1">
-            <a:off x="19339907" y="18157088"/>
+            <a:off x="19339907" y="18614288"/>
             <a:ext cx="0" cy="540000"/>
           </a:xfrm>
           <a:prstGeom prst="line">
@@ -6505,7 +6516,7 @@
         </p:nvCxnSpPr>
         <p:spPr>
           <a:xfrm flipH="1">
-            <a:off x="12275539" y="18665032"/>
+            <a:off x="12275539" y="19122232"/>
             <a:ext cx="6336000" cy="0"/>
           </a:xfrm>
           <a:prstGeom prst="line">
@@ -6543,7 +6554,7 @@
         </p:nvCxnSpPr>
         <p:spPr>
           <a:xfrm flipV="1">
-            <a:off x="12288934" y="18602858"/>
+            <a:off x="12288934" y="19060058"/>
             <a:ext cx="0" cy="972000"/>
           </a:xfrm>
           <a:prstGeom prst="line">
@@ -6583,7 +6594,7 @@
         </p:nvSpPr>
         <p:spPr>
           <a:xfrm>
-            <a:off x="12184678" y="19546922"/>
+            <a:off x="12184678" y="20004122"/>
             <a:ext cx="216000" cy="216000"/>
           </a:xfrm>
           <a:prstGeom prst="ellipse">
@@ -6629,7 +6640,7 @@
         </p:nvSpPr>
         <p:spPr>
           <a:xfrm>
-            <a:off x="10623933" y="20277460"/>
+            <a:off x="10623933" y="20734660"/>
             <a:ext cx="9444791" cy="1815882"/>
           </a:xfrm>
           <a:prstGeom prst="rect">
@@ -6802,7 +6813,7 @@
         </p:nvCxnSpPr>
         <p:spPr>
           <a:xfrm flipH="1" flipV="1">
-            <a:off x="18915093" y="19282627"/>
+            <a:off x="18915093" y="19739827"/>
             <a:ext cx="0" cy="1476000"/>
           </a:xfrm>
           <a:prstGeom prst="line">
@@ -6842,7 +6853,7 @@
         </p:nvSpPr>
         <p:spPr>
           <a:xfrm>
-            <a:off x="16101860" y="18050817"/>
+            <a:off x="16101860" y="18508017"/>
             <a:ext cx="216000" cy="216000"/>
           </a:xfrm>
           <a:prstGeom prst="ellipse">
@@ -6892,7 +6903,7 @@
         </p:nvSpPr>
         <p:spPr>
           <a:xfrm>
-            <a:off x="19245355" y="18648835"/>
+            <a:off x="19245355" y="19106035"/>
             <a:ext cx="216000" cy="216000"/>
           </a:xfrm>
           <a:prstGeom prst="ellipse">
@@ -6940,7 +6951,7 @@
         </p:nvSpPr>
         <p:spPr>
           <a:xfrm>
-            <a:off x="15880141" y="17678447"/>
+            <a:off x="15880141" y="18135647"/>
             <a:ext cx="4194679" cy="1929009"/>
           </a:xfrm>
           <a:prstGeom prst="rect">
@@ -6990,7 +7001,7 @@
         </p:nvSpPr>
         <p:spPr>
           <a:xfrm>
-            <a:off x="10581261" y="16028578"/>
+            <a:off x="10581261" y="16485778"/>
             <a:ext cx="720000" cy="720000"/>
           </a:xfrm>
           <a:prstGeom prst="ellipse">
@@ -7036,7 +7047,7 @@
         </p:nvSpPr>
         <p:spPr>
           <a:xfrm>
-            <a:off x="10046038" y="16134776"/>
+            <a:off x="10046038" y="16591976"/>
             <a:ext cx="1779073" cy="461665"/>
           </a:xfrm>
           <a:prstGeom prst="rect">
@@ -7069,7 +7080,7 @@
         </p:nvSpPr>
         <p:spPr>
           <a:xfrm>
-            <a:off x="11382193" y="16176198"/>
+            <a:off x="11382193" y="16633398"/>
             <a:ext cx="8775874" cy="1015663"/>
           </a:xfrm>
           <a:prstGeom prst="rect">
@@ -7143,7 +7154,7 @@
         </p:nvSpPr>
         <p:spPr>
           <a:xfrm>
-            <a:off x="15957816" y="17649255"/>
+            <a:off x="15957816" y="18106455"/>
             <a:ext cx="4117004" cy="1938992"/>
           </a:xfrm>
           <a:prstGeom prst="rect">
@@ -7250,7 +7261,7 @@
         </p:nvSpPr>
         <p:spPr>
           <a:xfrm>
-            <a:off x="12859194" y="17257598"/>
+            <a:off x="12859194" y="17714798"/>
             <a:ext cx="2393184" cy="2393184"/>
           </a:xfrm>
           <a:prstGeom prst="ellipse">
@@ -7307,7 +7318,7 @@
         </p:blipFill>
         <p:spPr>
           <a:xfrm>
-            <a:off x="14319569" y="18045721"/>
+            <a:off x="14319569" y="18502921"/>
             <a:ext cx="647564" cy="894816"/>
           </a:xfrm>
           <a:prstGeom prst="rect">
@@ -7330,7 +7341,7 @@
         </p:blipFill>
         <p:spPr>
           <a:xfrm>
-            <a:off x="13618789" y="18083157"/>
+            <a:off x="13618789" y="18540357"/>
             <a:ext cx="569406" cy="819945"/>
           </a:xfrm>
           <a:prstGeom prst="rect">
@@ -7346,7 +7357,7 @@
         </p:nvSpPr>
         <p:spPr>
           <a:xfrm>
-            <a:off x="12826985" y="17862001"/>
+            <a:off x="12826985" y="18319201"/>
             <a:ext cx="2507130" cy="1107996"/>
           </a:xfrm>
           <a:prstGeom prst="rect">
@@ -7378,7 +7389,7 @@
         </p:nvSpPr>
         <p:spPr>
           <a:xfrm>
-            <a:off x="16334471" y="17159568"/>
+            <a:off x="16334471" y="17616768"/>
             <a:ext cx="3423142" cy="523220"/>
           </a:xfrm>
           <a:prstGeom prst="rect">
@@ -7421,7 +7432,7 @@
         </p:nvSpPr>
         <p:spPr>
           <a:xfrm>
-            <a:off x="10738093" y="17534131"/>
+            <a:off x="10738093" y="17991331"/>
             <a:ext cx="2302881" cy="1815882"/>
           </a:xfrm>
           <a:prstGeom prst="rect">
@@ -7474,7 +7485,7 @@
         </p:nvCxnSpPr>
         <p:spPr>
           <a:xfrm flipV="1">
-            <a:off x="13924113" y="18977113"/>
+            <a:off x="13924113" y="19434313"/>
             <a:ext cx="0" cy="1330544"/>
           </a:xfrm>
           <a:prstGeom prst="line">
@@ -7510,7 +7521,7 @@
         </p:nvCxnSpPr>
         <p:spPr>
           <a:xfrm flipH="1">
-            <a:off x="15021997" y="18462134"/>
+            <a:off x="15021997" y="18919334"/>
             <a:ext cx="930261" cy="0"/>
           </a:xfrm>
           <a:prstGeom prst="line">
@@ -7548,7 +7559,7 @@
         </p:nvSpPr>
         <p:spPr>
           <a:xfrm>
-            <a:off x="10587357" y="22106290"/>
+            <a:off x="10587357" y="22563490"/>
             <a:ext cx="720000" cy="720000"/>
           </a:xfrm>
           <a:prstGeom prst="ellipse">
@@ -7594,7 +7605,7 @@
         </p:nvSpPr>
         <p:spPr>
           <a:xfrm>
-            <a:off x="10052134" y="22212488"/>
+            <a:off x="10052134" y="22669688"/>
             <a:ext cx="1779073" cy="461665"/>
           </a:xfrm>
           <a:prstGeom prst="rect">
@@ -7627,7 +7638,7 @@
         </p:nvSpPr>
         <p:spPr>
           <a:xfrm>
-            <a:off x="11388289" y="22253910"/>
+            <a:off x="11388289" y="22711110"/>
             <a:ext cx="4184350" cy="1323439"/>
           </a:xfrm>
           <a:prstGeom prst="rect">
@@ -7659,7 +7670,7 @@
         </p:nvSpPr>
         <p:spPr>
           <a:xfrm>
-            <a:off x="10630029" y="24873844"/>
+            <a:off x="10630029" y="25331044"/>
             <a:ext cx="9444791" cy="1384995"/>
           </a:xfrm>
           <a:prstGeom prst="rect">
@@ -7801,7 +7812,7 @@
         </p:nvSpPr>
         <p:spPr>
           <a:xfrm>
-            <a:off x="15899643" y="22732865"/>
+            <a:off x="15899643" y="23190065"/>
             <a:ext cx="4194679" cy="1929009"/>
           </a:xfrm>
           <a:prstGeom prst="rect">
@@ -7849,7 +7860,7 @@
         </p:nvSpPr>
         <p:spPr>
           <a:xfrm>
-            <a:off x="15977318" y="22703673"/>
+            <a:off x="15977318" y="23160873"/>
             <a:ext cx="4117004" cy="1938992"/>
           </a:xfrm>
           <a:prstGeom prst="rect">
@@ -7954,7 +7965,7 @@
         </p:nvSpPr>
         <p:spPr>
           <a:xfrm>
-            <a:off x="16353973" y="22213986"/>
+            <a:off x="16353973" y="22671186"/>
             <a:ext cx="3423142" cy="523220"/>
           </a:xfrm>
           <a:prstGeom prst="rect">
@@ -7997,7 +8008,7 @@
         </p:nvSpPr>
         <p:spPr>
           <a:xfrm>
-            <a:off x="15961521" y="23296170"/>
+            <a:off x="15961521" y="23753370"/>
             <a:ext cx="3126564" cy="406123"/>
           </a:xfrm>
           <a:prstGeom prst="rect">
@@ -8043,7 +8054,7 @@
         </p:nvCxnSpPr>
         <p:spPr>
           <a:xfrm flipH="1">
-            <a:off x="13468430" y="23520349"/>
+            <a:off x="13468430" y="23977549"/>
             <a:ext cx="2520000" cy="0"/>
           </a:xfrm>
           <a:prstGeom prst="line">
@@ -8079,7 +8090,7 @@
         </p:nvCxnSpPr>
         <p:spPr>
           <a:xfrm flipH="1">
-            <a:off x="13468430" y="23509202"/>
+            <a:off x="13468430" y="23966402"/>
             <a:ext cx="0" cy="1476000"/>
           </a:xfrm>
           <a:prstGeom prst="line">
@@ -8118,7 +8129,7 @@
         </p:nvSpPr>
         <p:spPr>
           <a:xfrm>
-            <a:off x="10587357" y="26294242"/>
+            <a:off x="10587357" y="26751442"/>
             <a:ext cx="720000" cy="720000"/>
           </a:xfrm>
           <a:prstGeom prst="ellipse">
@@ -8164,7 +8175,7 @@
         </p:nvSpPr>
         <p:spPr>
           <a:xfrm>
-            <a:off x="10052134" y="26400440"/>
+            <a:off x="10052134" y="26857640"/>
             <a:ext cx="1779073" cy="461665"/>
           </a:xfrm>
           <a:prstGeom prst="rect">
@@ -8197,7 +8208,7 @@
         </p:nvSpPr>
         <p:spPr>
           <a:xfrm>
-            <a:off x="11388289" y="26441862"/>
+            <a:off x="11388289" y="26899062"/>
             <a:ext cx="8775874" cy="1015663"/>
           </a:xfrm>
           <a:prstGeom prst="rect">
@@ -8271,7 +8282,7 @@
         </p:nvSpPr>
         <p:spPr>
           <a:xfrm>
-            <a:off x="10636125" y="28372948"/>
+            <a:off x="10636125" y="28830148"/>
             <a:ext cx="9444791" cy="1384995"/>
           </a:xfrm>
           <a:prstGeom prst="rect">
@@ -8377,7 +8388,7 @@
         </p:nvSpPr>
         <p:spPr>
           <a:xfrm>
-            <a:off x="10672840" y="29239065"/>
+            <a:off x="10672840" y="29696265"/>
             <a:ext cx="792000" cy="504000"/>
           </a:xfrm>
           <a:prstGeom prst="rect">
@@ -8423,7 +8434,7 @@
         </p:nvCxnSpPr>
         <p:spPr>
           <a:xfrm flipV="1">
-            <a:off x="11039209" y="27816048"/>
+            <a:off x="11039209" y="28273248"/>
             <a:ext cx="0" cy="556900"/>
           </a:xfrm>
           <a:prstGeom prst="line">
@@ -8459,7 +8470,7 @@
         </p:nvCxnSpPr>
         <p:spPr>
           <a:xfrm flipV="1">
-            <a:off x="11493475" y="29483241"/>
+            <a:off x="11493475" y="29940441"/>
             <a:ext cx="362116" cy="0"/>
           </a:xfrm>
           <a:prstGeom prst="line">
@@ -8495,7 +8506,7 @@
         </p:nvCxnSpPr>
         <p:spPr>
           <a:xfrm flipV="1">
-            <a:off x="11849977" y="27858720"/>
+            <a:off x="11849977" y="28315920"/>
             <a:ext cx="0" cy="1620000"/>
           </a:xfrm>
           <a:prstGeom prst="line">
@@ -8531,7 +8542,7 @@
         </p:nvSpPr>
         <p:spPr>
           <a:xfrm>
-            <a:off x="10835322" y="27536234"/>
+            <a:off x="10835322" y="27993434"/>
             <a:ext cx="4267738" cy="594554"/>
           </a:xfrm>
           <a:prstGeom prst="rect">
@@ -8591,7 +8602,7 @@
         </p:nvSpPr>
         <p:spPr>
           <a:xfrm>
-            <a:off x="10599549" y="30000610"/>
+            <a:off x="10599549" y="30457810"/>
             <a:ext cx="720000" cy="720000"/>
           </a:xfrm>
           <a:prstGeom prst="ellipse">
@@ -8637,7 +8648,7 @@
         </p:nvSpPr>
         <p:spPr>
           <a:xfrm>
-            <a:off x="10082614" y="30015368"/>
+            <a:off x="10082614" y="30472568"/>
             <a:ext cx="1779073" cy="646331"/>
           </a:xfrm>
           <a:prstGeom prst="rect">
@@ -8670,7 +8681,7 @@
         </p:nvSpPr>
         <p:spPr>
           <a:xfrm>
-            <a:off x="11400481" y="30093366"/>
+            <a:off x="11400481" y="30550566"/>
             <a:ext cx="8775874" cy="954107"/>
           </a:xfrm>
           <a:prstGeom prst="rect">
@@ -8716,7 +8727,7 @@
         </p:nvCxnSpPr>
         <p:spPr>
           <a:xfrm flipH="1" flipV="1">
-            <a:off x="11527871" y="32138112"/>
+            <a:off x="11527871" y="32595312"/>
             <a:ext cx="0" cy="1080000"/>
           </a:xfrm>
           <a:prstGeom prst="line">
@@ -8752,7 +8763,7 @@
         </p:nvCxnSpPr>
         <p:spPr>
           <a:xfrm flipH="1" flipV="1">
-            <a:off x="13074332" y="32132073"/>
+            <a:off x="13074332" y="32589273"/>
             <a:ext cx="0" cy="648000"/>
           </a:xfrm>
           <a:prstGeom prst="line">
@@ -8788,7 +8799,7 @@
         </p:nvCxnSpPr>
         <p:spPr>
           <a:xfrm flipH="1">
-            <a:off x="11515222" y="32132130"/>
+            <a:off x="11515222" y="32589330"/>
             <a:ext cx="1584000" cy="0"/>
           </a:xfrm>
           <a:prstGeom prst="line">
@@ -8824,7 +8835,7 @@
         </p:nvCxnSpPr>
         <p:spPr>
           <a:xfrm flipH="1" flipV="1">
-            <a:off x="18323781" y="31748947"/>
+            <a:off x="18323781" y="32206147"/>
             <a:ext cx="0" cy="1908000"/>
           </a:xfrm>
           <a:prstGeom prst="line">
@@ -8860,7 +8871,7 @@
         </p:nvCxnSpPr>
         <p:spPr>
           <a:xfrm flipH="1">
-            <a:off x="18312384" y="31729737"/>
+            <a:off x="18312384" y="32186937"/>
             <a:ext cx="612000" cy="0"/>
           </a:xfrm>
           <a:prstGeom prst="line">
@@ -8896,7 +8907,7 @@
         </p:nvCxnSpPr>
         <p:spPr>
           <a:xfrm flipV="1">
-            <a:off x="18600782" y="31137447"/>
+            <a:off x="18600782" y="31594647"/>
             <a:ext cx="0" cy="540000"/>
           </a:xfrm>
           <a:prstGeom prst="line">
@@ -8932,7 +8943,7 @@
         </p:nvCxnSpPr>
         <p:spPr>
           <a:xfrm flipH="1">
-            <a:off x="12293827" y="31155736"/>
+            <a:off x="12293827" y="31612936"/>
             <a:ext cx="6336000" cy="0"/>
           </a:xfrm>
           <a:prstGeom prst="line">
@@ -8968,7 +8979,7 @@
         </p:nvCxnSpPr>
         <p:spPr>
           <a:xfrm flipV="1">
-            <a:off x="12288934" y="31075274"/>
+            <a:off x="12288934" y="31532474"/>
             <a:ext cx="0" cy="972000"/>
           </a:xfrm>
           <a:prstGeom prst="line">
@@ -9006,7 +9017,7 @@
         </p:nvSpPr>
         <p:spPr>
           <a:xfrm>
-            <a:off x="12184678" y="32019338"/>
+            <a:off x="12184678" y="32476538"/>
             <a:ext cx="216000" cy="216000"/>
           </a:xfrm>
           <a:prstGeom prst="ellipse">
@@ -9054,7 +9065,7 @@
         </p:nvSpPr>
         <p:spPr>
           <a:xfrm>
-            <a:off x="18506230" y="31629194"/>
+            <a:off x="18506230" y="32086394"/>
             <a:ext cx="216000" cy="216000"/>
           </a:xfrm>
           <a:prstGeom prst="ellipse">
@@ -9102,7 +9113,7 @@
         </p:nvSpPr>
         <p:spPr>
           <a:xfrm>
-            <a:off x="15362735" y="31049464"/>
+            <a:off x="15362735" y="31506664"/>
             <a:ext cx="216000" cy="216000"/>
           </a:xfrm>
           <a:prstGeom prst="ellipse">
@@ -9148,7 +9159,7 @@
         </p:nvSpPr>
         <p:spPr>
           <a:xfrm>
-            <a:off x="10623933" y="32749876"/>
+            <a:off x="10623933" y="33207076"/>
             <a:ext cx="9444791" cy="1815882"/>
           </a:xfrm>
           <a:prstGeom prst="rect">
@@ -9285,7 +9296,7 @@
         </p:nvCxnSpPr>
         <p:spPr>
           <a:xfrm flipH="1" flipV="1">
-            <a:off x="18915093" y="31755043"/>
+            <a:off x="18915093" y="32212243"/>
             <a:ext cx="0" cy="1476000"/>
           </a:xfrm>
           <a:prstGeom prst="line">
@@ -9321,7 +9332,7 @@
         </p:nvSpPr>
         <p:spPr>
           <a:xfrm>
-            <a:off x="13652458" y="31197419"/>
+            <a:off x="13652458" y="31654619"/>
             <a:ext cx="3650196" cy="523220"/>
           </a:xfrm>
           <a:prstGeom prst="rect">
@@ -9364,7 +9375,7 @@
         </p:nvSpPr>
         <p:spPr>
           <a:xfrm>
-            <a:off x="18590518" y="31218658"/>
+            <a:off x="18590518" y="31675858"/>
             <a:ext cx="730921" cy="523220"/>
           </a:xfrm>
           <a:prstGeom prst="rect">
@@ -9407,7 +9418,7 @@
         </p:nvSpPr>
         <p:spPr>
           <a:xfrm>
-            <a:off x="11935665" y="32176175"/>
+            <a:off x="11935665" y="32633375"/>
             <a:ext cx="730921" cy="523220"/>
           </a:xfrm>
           <a:prstGeom prst="rect">
@@ -9450,7 +9461,7 @@
         </p:nvSpPr>
         <p:spPr>
           <a:xfrm>
-            <a:off x="10678936" y="34054905"/>
+            <a:off x="10678936" y="34512105"/>
             <a:ext cx="792000" cy="504000"/>
           </a:xfrm>
           <a:prstGeom prst="rect">
@@ -9496,7 +9507,7 @@
         </p:nvSpPr>
         <p:spPr>
           <a:xfrm>
-            <a:off x="10623933" y="33221266"/>
+            <a:off x="10623933" y="33678466"/>
             <a:ext cx="1651606" cy="504000"/>
           </a:xfrm>
           <a:prstGeom prst="rect">
@@ -9542,7 +9553,7 @@
         </p:nvSpPr>
         <p:spPr>
           <a:xfrm>
-            <a:off x="12043024" y="32771819"/>
+            <a:off x="12043024" y="33229019"/>
             <a:ext cx="2000646" cy="504000"/>
           </a:xfrm>
           <a:prstGeom prst="rect">
@@ -9588,7 +9599,7 @@
         </p:nvCxnSpPr>
         <p:spPr>
           <a:xfrm flipV="1">
-            <a:off x="11063593" y="33452723"/>
+            <a:off x="11063593" y="34182883"/>
             <a:ext cx="0" cy="324000"/>
           </a:xfrm>
           <a:prstGeom prst="line">
@@ -9624,7 +9635,7 @@
         </p:nvCxnSpPr>
         <p:spPr>
           <a:xfrm flipV="1">
-            <a:off x="13063081" y="33278064"/>
+            <a:off x="13063081" y="33735264"/>
             <a:ext cx="0" cy="1008000"/>
           </a:xfrm>
           <a:prstGeom prst="line">
@@ -9660,7 +9671,7 @@
         </p:nvCxnSpPr>
         <p:spPr>
           <a:xfrm flipV="1">
-            <a:off x="11462995" y="34317369"/>
+            <a:off x="11462995" y="34774569"/>
             <a:ext cx="1620000" cy="0"/>
           </a:xfrm>
           <a:prstGeom prst="line">
@@ -9696,7 +9707,7 @@
         </p:nvSpPr>
         <p:spPr>
           <a:xfrm>
-            <a:off x="10950395" y="34940074"/>
+            <a:off x="10950395" y="35397274"/>
             <a:ext cx="5836589" cy="646331"/>
           </a:xfrm>
           <a:prstGeom prst="rect">
@@ -9726,7 +9737,7 @@
         </p:nvSpPr>
         <p:spPr>
           <a:xfrm>
-            <a:off x="3507598" y="4901698"/>
+            <a:off x="3507598" y="5358898"/>
             <a:ext cx="4595611" cy="1015663"/>
           </a:xfrm>
           <a:prstGeom prst="rect">
@@ -9759,7 +9770,7 @@
         </p:nvSpPr>
         <p:spPr>
           <a:xfrm>
-            <a:off x="1412811" y="5852149"/>
+            <a:off x="1412811" y="6309349"/>
             <a:ext cx="8765763" cy="8217634"/>
           </a:xfrm>
           <a:prstGeom prst="rect">
@@ -9964,7 +9975,7 @@
         </p:nvSpPr>
         <p:spPr>
           <a:xfrm>
-            <a:off x="2360429" y="8059952"/>
+            <a:off x="2360429" y="8517152"/>
             <a:ext cx="4140828" cy="900565"/>
           </a:xfrm>
           <a:prstGeom prst="arc">
@@ -10011,7 +10022,7 @@
         </p:nvSpPr>
         <p:spPr>
           <a:xfrm>
-            <a:off x="3955312" y="8257723"/>
+            <a:off x="3955312" y="8714923"/>
             <a:ext cx="2524207" cy="457130"/>
           </a:xfrm>
           <a:prstGeom prst="arc">
@@ -10058,7 +10069,7 @@
         </p:nvSpPr>
         <p:spPr>
           <a:xfrm>
-            <a:off x="1741838" y="15273871"/>
+            <a:off x="1741838" y="15731071"/>
             <a:ext cx="8425315" cy="4524315"/>
           </a:xfrm>
           <a:prstGeom prst="rect">
@@ -10198,7 +10209,7 @@
         </p:nvSpPr>
         <p:spPr>
           <a:xfrm>
-            <a:off x="3771126" y="14273078"/>
+            <a:off x="3771126" y="14730278"/>
             <a:ext cx="4595611" cy="1015663"/>
           </a:xfrm>
           <a:prstGeom prst="rect">
@@ -10231,7 +10242,7 @@
         </p:nvSpPr>
         <p:spPr>
           <a:xfrm>
-            <a:off x="3160909" y="20006801"/>
+            <a:off x="3160909" y="20464001"/>
             <a:ext cx="4595611" cy="1015663"/>
           </a:xfrm>
           <a:prstGeom prst="rect">
@@ -10268,7 +10279,7 @@
         </p:nvSpPr>
         <p:spPr>
           <a:xfrm>
-            <a:off x="813514" y="20958631"/>
+            <a:off x="813514" y="21415831"/>
             <a:ext cx="9374847" cy="4154984"/>
           </a:xfrm>
           <a:prstGeom prst="rect">
@@ -10412,7 +10423,7 @@
         </p:nvSpPr>
         <p:spPr>
           <a:xfrm>
-            <a:off x="10687216" y="7532160"/>
+            <a:off x="10687216" y="7989360"/>
             <a:ext cx="792000" cy="504000"/>
           </a:xfrm>
           <a:prstGeom prst="rect">
@@ -10458,7 +10469,7 @@
         </p:nvSpPr>
         <p:spPr>
           <a:xfrm>
-            <a:off x="1123261" y="24593859"/>
+            <a:off x="1123261" y="25051059"/>
             <a:ext cx="1237168" cy="442522"/>
           </a:xfrm>
           <a:prstGeom prst="rect">
@@ -10504,7 +10515,7 @@
         </p:nvSpPr>
         <p:spPr>
           <a:xfrm>
-            <a:off x="5799173" y="25022697"/>
+            <a:off x="5799173" y="25479897"/>
             <a:ext cx="4072412" cy="461665"/>
           </a:xfrm>
           <a:prstGeom prst="rect">
@@ -10557,7 +10568,7 @@
         </p:nvSpPr>
         <p:spPr>
           <a:xfrm>
-            <a:off x="1811084" y="24224974"/>
+            <a:off x="1811084" y="24682174"/>
             <a:ext cx="4140828" cy="900565"/>
           </a:xfrm>
           <a:prstGeom prst="arc">
@@ -10604,7 +10615,7 @@
         </p:nvSpPr>
         <p:spPr>
           <a:xfrm>
-            <a:off x="3405967" y="24422745"/>
+            <a:off x="3405967" y="24879945"/>
             <a:ext cx="2524207" cy="457130"/>
           </a:xfrm>
           <a:prstGeom prst="arc">
@@ -10651,7 +10662,7 @@
         </p:nvSpPr>
         <p:spPr>
           <a:xfrm>
-            <a:off x="2891809" y="24597404"/>
+            <a:off x="2891809" y="25054604"/>
             <a:ext cx="792000" cy="442522"/>
           </a:xfrm>
           <a:prstGeom prst="rect">
@@ -10697,7 +10708,7 @@
         </p:nvSpPr>
         <p:spPr>
           <a:xfrm>
-            <a:off x="5574757" y="24600949"/>
+            <a:off x="5574757" y="25058149"/>
             <a:ext cx="720000" cy="442522"/>
           </a:xfrm>
           <a:prstGeom prst="rect">
@@ -10743,7 +10754,7 @@
         </p:nvSpPr>
         <p:spPr>
           <a:xfrm>
-            <a:off x="629074" y="25024923"/>
+            <a:off x="629074" y="25482123"/>
             <a:ext cx="4347657" cy="461665"/>
           </a:xfrm>
           <a:prstGeom prst="rect">
@@ -10806,7 +10817,7 @@
         </p:nvSpPr>
         <p:spPr>
           <a:xfrm>
-            <a:off x="2995233" y="25622478"/>
+            <a:off x="2995233" y="26079678"/>
             <a:ext cx="6302734" cy="1015663"/>
           </a:xfrm>
           <a:prstGeom prst="rect">
@@ -10843,7 +10854,7 @@
         </p:nvSpPr>
         <p:spPr>
           <a:xfrm>
-            <a:off x="2068956" y="26631699"/>
+            <a:off x="2068956" y="27088899"/>
             <a:ext cx="8157922" cy="2677656"/>
           </a:xfrm>
           <a:prstGeom prst="rect">
@@ -10996,7 +11007,7 @@
         </p:nvSpPr>
         <p:spPr>
           <a:xfrm>
-            <a:off x="2641767" y="29557187"/>
+            <a:off x="2641767" y="30014387"/>
             <a:ext cx="6302734" cy="1015663"/>
           </a:xfrm>
           <a:prstGeom prst="rect">
@@ -11033,7 +11044,7 @@
         </p:nvSpPr>
         <p:spPr>
           <a:xfrm>
-            <a:off x="1370027" y="30592805"/>
+            <a:off x="1370027" y="31050005"/>
             <a:ext cx="8839376" cy="6001643"/>
           </a:xfrm>
           <a:prstGeom prst="rect">
@@ -11277,13 +11288,13 @@
           <p:nvPr>
             <p:extLst>
               <p:ext uri="{D42A27DB-BD31-4B8C-83A1-F6EECF244321}">
-                <p14:modId xmlns:p14="http://schemas.microsoft.com/office/powerpoint/2010/main" val="1960674818"/>
+                <p14:modId xmlns:p14="http://schemas.microsoft.com/office/powerpoint/2010/main" val="1207620195"/>
               </p:ext>
             </p:extLst>
           </p:nvPr>
         </p:nvGraphicFramePr>
         <p:xfrm>
-          <a:off x="3420949" y="36693873"/>
+          <a:off x="3420949" y="37151073"/>
           <a:ext cx="4524808" cy="2956356"/>
         </p:xfrm>
         <a:graphic>
@@ -11808,7 +11819,7 @@
         </p:nvSpPr>
         <p:spPr>
           <a:xfrm>
-            <a:off x="1260411" y="39642587"/>
+            <a:off x="1260411" y="40099787"/>
             <a:ext cx="8839376" cy="461665"/>
           </a:xfrm>
           <a:prstGeom prst="rect">
@@ -11832,7 +11843,11 @@
             </a:r>
             <a:r>
               <a:rPr lang="en-US" sz="2400" dirty="0" smtClean="0"/>
-              <a:t>-anaphoric pronouns in P&amp;P)</a:t>
+              <a:t>-anaphoric pronouns in </a:t>
+            </a:r>
+            <a:r>
+              <a:rPr lang="en-US" sz="2400" dirty="0" smtClean="0"/>
+              <a:t>P&amp;P.)</a:t>
             </a:r>
             <a:endParaRPr lang="en-US" sz="2400" dirty="0"/>
           </a:p>
@@ -11846,7 +11861,7 @@
         </p:nvSpPr>
         <p:spPr>
           <a:xfrm>
-            <a:off x="22814881" y="4478773"/>
+            <a:off x="22814881" y="4935973"/>
             <a:ext cx="4595611" cy="1015663"/>
           </a:xfrm>
           <a:prstGeom prst="rect">
@@ -11872,200 +11887,6 @@
               <a:ea typeface="Times New Roman" charset="0"/>
               <a:cs typeface="Times New Roman" charset="0"/>
             </a:endParaRPr>
-          </a:p>
-        </p:txBody>
-      </p:sp>
-      <p:sp>
-        <p:nvSpPr>
-          <p:cNvPr id="315" name="Rectangle 314"/>
-          <p:cNvSpPr/>
-          <p:nvPr/>
-        </p:nvSpPr>
-        <p:spPr>
-          <a:xfrm>
-            <a:off x="20552833" y="5465459"/>
-            <a:ext cx="9086362" cy="4524315"/>
-          </a:xfrm>
-          <a:prstGeom prst="rect">
-            <a:avLst/>
-          </a:prstGeom>
-        </p:spPr>
-        <p:txBody>
-          <a:bodyPr wrap="square">
-            <a:spAutoFit/>
-          </a:bodyPr>
-          <a:lstStyle/>
-          <a:p>
-            <a:r>
-              <a:rPr lang="en-US" sz="2400" dirty="0"/>
-              <a:t>Our dataset comprises </a:t>
-            </a:r>
-            <a:r>
-              <a:rPr lang="en-US" sz="2400" dirty="0" smtClean="0"/>
-              <a:t>of,</a:t>
-            </a:r>
-          </a:p>
-          <a:p>
-            <a:endParaRPr lang="en-US" sz="2400" dirty="0" smtClean="0"/>
-          </a:p>
-          <a:p>
-            <a:pPr marL="342900" indent="-342900">
-              <a:buFont typeface="Arial" charset="0"/>
-              <a:buChar char="•"/>
-            </a:pPr>
-            <a:r>
-              <a:rPr lang="en-US" sz="2400" dirty="0"/>
-              <a:t>T</a:t>
-            </a:r>
-            <a:r>
-              <a:rPr lang="en-US" sz="2400" dirty="0" smtClean="0"/>
-              <a:t>he </a:t>
-            </a:r>
-            <a:r>
-              <a:rPr lang="en-US" sz="2400" b="1" i="1" dirty="0"/>
-              <a:t>Pride and Prejudice </a:t>
-            </a:r>
-            <a:r>
-              <a:rPr lang="en-US" sz="2400" b="1" dirty="0"/>
-              <a:t>novel (P&amp;P) </a:t>
-            </a:r>
-            <a:r>
-              <a:rPr lang="en-US" sz="2400" dirty="0"/>
-              <a:t>(121440 </a:t>
-            </a:r>
-            <a:r>
-              <a:rPr lang="en-US" sz="2400" dirty="0" smtClean="0"/>
-              <a:t>words) with </a:t>
-            </a:r>
-            <a:r>
-              <a:rPr lang="en-US" sz="2400" dirty="0"/>
-              <a:t>all mentions of character </a:t>
-            </a:r>
-            <a:r>
-              <a:rPr lang="en-US" sz="2400" dirty="0" smtClean="0"/>
-              <a:t>fully </a:t>
-            </a:r>
-            <a:r>
-              <a:rPr lang="en-US" sz="2400" dirty="0"/>
-              <a:t>resolved to their antecedents, including mentions referencing multiple characters. </a:t>
-            </a:r>
-            <a:endParaRPr lang="en-US" sz="2400" dirty="0" smtClean="0"/>
-          </a:p>
-          <a:p>
-            <a:pPr marL="342900" indent="-342900">
-              <a:buFont typeface="Arial" charset="0"/>
-              <a:buChar char="•"/>
-            </a:pPr>
-            <a:endParaRPr lang="en-US" sz="2400" dirty="0" smtClean="0"/>
-          </a:p>
-          <a:p>
-            <a:pPr marL="342900" indent="-342900">
-              <a:buFont typeface="Arial" charset="0"/>
-              <a:buChar char="•"/>
-            </a:pPr>
-            <a:r>
-              <a:rPr lang="en-US" sz="2400" dirty="0" smtClean="0"/>
-              <a:t>36 </a:t>
-            </a:r>
-            <a:r>
-              <a:rPr lang="en-US" sz="2400" dirty="0"/>
-              <a:t>short </a:t>
-            </a:r>
-            <a:r>
-              <a:rPr lang="en-US" sz="2400" dirty="0" smtClean="0"/>
-              <a:t>stories </a:t>
-            </a:r>
-            <a:r>
-              <a:rPr lang="en-US" sz="2400" dirty="0"/>
-              <a:t>from the </a:t>
-            </a:r>
-            <a:r>
-              <a:rPr lang="en-US" sz="2400" b="1" i="1" dirty="0"/>
-              <a:t>Scribner Anthology of Contemporary Short Fiction </a:t>
-            </a:r>
-            <a:r>
-              <a:rPr lang="en-US" sz="2400" dirty="0"/>
-              <a:t>(</a:t>
-            </a:r>
-            <a:r>
-              <a:rPr lang="en-US" sz="2400" dirty="0" err="1"/>
-              <a:t>Martone</a:t>
-            </a:r>
-            <a:r>
-              <a:rPr lang="en-US" sz="2400" dirty="0"/>
-              <a:t> et al., 1999) </a:t>
-            </a:r>
-            <a:r>
-              <a:rPr lang="en-US" sz="2400" b="1" dirty="0"/>
-              <a:t>(Scribner)</a:t>
-            </a:r>
-            <a:r>
-              <a:rPr lang="en-US" sz="2400" dirty="0"/>
-              <a:t> (</a:t>
-            </a:r>
-            <a:r>
-              <a:rPr lang="en-US" sz="2400" dirty="0" smtClean="0"/>
-              <a:t>total </a:t>
-            </a:r>
-            <a:r>
-              <a:rPr lang="en-US" sz="2400" dirty="0"/>
-              <a:t>of 216901 words), representing an eclectic </a:t>
-            </a:r>
-            <a:r>
-              <a:rPr lang="en-US" sz="2400" dirty="0" smtClean="0"/>
-              <a:t>collection </a:t>
-            </a:r>
-            <a:r>
-              <a:rPr lang="en-US" sz="2400" dirty="0"/>
-              <a:t>of stories from the modern era. A</a:t>
-            </a:r>
-            <a:r>
-              <a:rPr lang="en-US" sz="2400" dirty="0" smtClean="0"/>
-              <a:t>ll </a:t>
-            </a:r>
-            <a:r>
-              <a:rPr lang="en-US" sz="2400" dirty="0"/>
-              <a:t>mentions of </a:t>
-            </a:r>
-            <a:r>
-              <a:rPr lang="en-US" sz="2400" i="1" dirty="0"/>
-              <a:t>they </a:t>
-            </a:r>
-            <a:r>
-              <a:rPr lang="en-US" sz="2400" dirty="0"/>
-              <a:t>and </a:t>
-            </a:r>
-            <a:r>
-              <a:rPr lang="en-US" sz="2400" i="1" dirty="0"/>
-              <a:t>them </a:t>
-            </a:r>
-            <a:r>
-              <a:rPr lang="en-US" sz="2400" dirty="0" smtClean="0"/>
-              <a:t>have been resolved (</a:t>
-            </a:r>
-            <a:r>
-              <a:rPr lang="en-US" sz="2400" i="1" dirty="0" smtClean="0"/>
-              <a:t>m</a:t>
-            </a:r>
-            <a:r>
-              <a:rPr lang="en-US" sz="2400" dirty="0" smtClean="0"/>
-              <a:t>-anaphoric, 1-anaphoric, and singleton), </a:t>
-            </a:r>
-            <a:r>
-              <a:rPr lang="en-US" sz="2400" dirty="0"/>
-              <a:t>including those of </a:t>
-            </a:r>
-            <a:r>
-              <a:rPr lang="en-US" sz="2400" dirty="0" smtClean="0"/>
-              <a:t>non-person </a:t>
-            </a:r>
-            <a:r>
-              <a:rPr lang="en-US" sz="2400" dirty="0"/>
-              <a:t>entities. </a:t>
-            </a:r>
-          </a:p>
-          <a:p>
-            <a:endParaRPr lang="en-US" sz="2400" dirty="0"/>
           </a:p>
         </p:txBody>
       </p:sp>
@@ -12078,13 +11899,13 @@
           <p:nvPr>
             <p:extLst>
               <p:ext uri="{D42A27DB-BD31-4B8C-83A1-F6EECF244321}">
-                <p14:modId xmlns:p14="http://schemas.microsoft.com/office/powerpoint/2010/main" val="1363029702"/>
+                <p14:modId xmlns:p14="http://schemas.microsoft.com/office/powerpoint/2010/main" val="769833061"/>
               </p:ext>
             </p:extLst>
           </p:nvPr>
         </p:nvGraphicFramePr>
         <p:xfrm>
-          <a:off x="20708311" y="9796459"/>
+          <a:off x="20721959" y="10253659"/>
           <a:ext cx="8745800" cy="2286000"/>
         </p:xfrm>
         <a:graphic>
@@ -12730,7 +12551,7 @@
         </p:nvSpPr>
         <p:spPr>
           <a:xfrm>
-            <a:off x="20307741" y="12108289"/>
+            <a:off x="20307741" y="12565489"/>
             <a:ext cx="9527307" cy="830997"/>
           </a:xfrm>
           <a:prstGeom prst="rect">
@@ -12808,7 +12629,7 @@
         </p:nvSpPr>
         <p:spPr>
           <a:xfrm>
-            <a:off x="20560855" y="12884935"/>
+            <a:off x="20560855" y="13342135"/>
             <a:ext cx="9086362" cy="4893647"/>
           </a:xfrm>
           <a:prstGeom prst="rect">
@@ -12968,7 +12789,7 @@
         </p:nvSpPr>
         <p:spPr>
           <a:xfrm>
-            <a:off x="22341319" y="17941632"/>
+            <a:off x="22341319" y="18398832"/>
             <a:ext cx="4595611" cy="1015663"/>
           </a:xfrm>
           <a:prstGeom prst="rect">
@@ -13005,8 +12826,8 @@
         </p:nvSpPr>
         <p:spPr>
           <a:xfrm>
-            <a:off x="20545266" y="18908017"/>
-            <a:ext cx="8203893" cy="3785652"/>
+            <a:off x="20545266" y="19365217"/>
+            <a:ext cx="8203893" cy="2677656"/>
           </a:xfrm>
           <a:prstGeom prst="rect">
             <a:avLst/>
@@ -13149,7 +12970,11 @@
             </a:r>
             <a:r>
               <a:rPr lang="en-US" sz="2400" dirty="0" smtClean="0"/>
-              <a:t>a document, and </a:t>
+              <a:t>a document, </a:t>
+            </a:r>
+            <a:r>
+              <a:rPr lang="en-US" sz="2400" dirty="0" smtClean="0"/>
+              <a:t>and let </a:t>
             </a:r>
             <a:r>
               <a:rPr lang="en-US" sz="2400" i="1" dirty="0" smtClean="0"/>
@@ -13188,12 +13013,24 @@
               <a:t> </a:t>
             </a:r>
             <a:r>
+              <a:rPr lang="en-US" sz="2400" i="1" dirty="0" smtClean="0"/>
+              <a:t> </a:t>
+            </a:r>
+            <a:r>
               <a:rPr lang="en-US" sz="2400" dirty="0" smtClean="0"/>
-              <a:t>are predicted</a:t>
+              <a:t>represent the </a:t>
+            </a:r>
+            <a:r>
+              <a:rPr lang="en-US" sz="2400" dirty="0" smtClean="0"/>
+              <a:t>p</a:t>
+            </a:r>
+            <a:r>
+              <a:rPr lang="en-US" sz="2400" dirty="0" smtClean="0"/>
+              <a:t>redicted number, </a:t>
             </a:r>
             <a:r>
               <a:rPr lang="en-US" sz="2400" dirty="0"/>
-              <a:t>, of which </a:t>
+              <a:t>of which </a:t>
             </a:r>
             <a:r>
               <a:rPr lang="en-US" sz="2400" i="1" dirty="0" smtClean="0"/>
@@ -13233,131 +13070,13 @@
             </a:r>
             <a:r>
               <a:rPr lang="en-US" sz="2400" dirty="0" smtClean="0"/>
-              <a:t>are correct.</a:t>
-            </a:r>
-          </a:p>
-          <a:p>
-            <a:endParaRPr lang="en-US" sz="2400" dirty="0"/>
-          </a:p>
-          <a:p>
-            <a:r>
-              <a:rPr lang="en-US" sz="2400" b="1" dirty="0" smtClean="0"/>
-              <a:t>Precision = </a:t>
-            </a:r>
-            <a:r>
-              <a:rPr lang="en-US" sz="2400" b="1" dirty="0" err="1" smtClean="0"/>
-              <a:t>Σ</a:t>
-            </a:r>
-            <a:r>
-              <a:rPr lang="en-US" sz="2400" b="1" i="1" baseline="-25000" dirty="0" err="1" smtClean="0"/>
-              <a:t>i</a:t>
-            </a:r>
-            <a:r>
-              <a:rPr lang="en-US" sz="2400" b="1" dirty="0" smtClean="0"/>
-              <a:t> </a:t>
-            </a:r>
-            <a:r>
-              <a:rPr lang="en-US" sz="2400" b="1" i="1" dirty="0" err="1" smtClean="0"/>
-              <a:t>k</a:t>
-            </a:r>
-            <a:r>
-              <a:rPr lang="en-US" sz="2400" b="1" i="1" baseline="-25000" dirty="0" err="1" smtClean="0"/>
-              <a:t>i</a:t>
-            </a:r>
-            <a:r>
-              <a:rPr lang="en-US" sz="2400" b="1" i="1" dirty="0" smtClean="0"/>
-              <a:t> </a:t>
-            </a:r>
-            <a:r>
-              <a:rPr lang="en-US" sz="2400" b="1" dirty="0" smtClean="0"/>
-              <a:t>/ </a:t>
-            </a:r>
-            <a:r>
-              <a:rPr lang="en-US" sz="2400" b="1" dirty="0" err="1"/>
-              <a:t>Σ</a:t>
-            </a:r>
-            <a:r>
-              <a:rPr lang="en-US" sz="2400" b="1" i="1" baseline="-25000" dirty="0" err="1"/>
-              <a:t>i</a:t>
-            </a:r>
-            <a:r>
-              <a:rPr lang="en-US" sz="2400" b="1" dirty="0"/>
-              <a:t> </a:t>
-            </a:r>
-            <a:r>
-              <a:rPr lang="en-US" sz="2400" b="1" i="1" dirty="0" smtClean="0"/>
-              <a:t>m</a:t>
-            </a:r>
-            <a:r>
-              <a:rPr lang="en-US" sz="2400" b="1" i="1" baseline="-25000" dirty="0" smtClean="0"/>
-              <a:t>i</a:t>
-            </a:r>
-            <a:r>
-              <a:rPr lang="en-US" sz="2400" b="1" dirty="0" smtClean="0"/>
-              <a:t> </a:t>
-            </a:r>
-          </a:p>
-          <a:p>
-            <a:r>
-              <a:rPr lang="en-US" sz="2400" b="1" dirty="0" smtClean="0"/>
-              <a:t>Recall = </a:t>
-            </a:r>
-            <a:r>
-              <a:rPr lang="en-US" sz="2400" b="1" dirty="0" err="1"/>
-              <a:t>Σ</a:t>
-            </a:r>
-            <a:r>
-              <a:rPr lang="en-US" sz="2400" b="1" i="1" baseline="-25000" dirty="0" err="1"/>
-              <a:t>i</a:t>
-            </a:r>
-            <a:r>
-              <a:rPr lang="en-US" sz="2400" b="1" dirty="0"/>
-              <a:t> </a:t>
-            </a:r>
-            <a:r>
-              <a:rPr lang="en-US" sz="2400" b="1" i="1" dirty="0" err="1" smtClean="0"/>
-              <a:t>k</a:t>
-            </a:r>
-            <a:r>
-              <a:rPr lang="en-US" sz="2400" b="1" i="1" baseline="-25000" dirty="0" err="1" smtClean="0"/>
-              <a:t>i</a:t>
-            </a:r>
-            <a:r>
-              <a:rPr lang="en-US" sz="2400" b="1" i="1" dirty="0" smtClean="0"/>
-              <a:t> </a:t>
-            </a:r>
-            <a:r>
-              <a:rPr lang="en-US" sz="2400" b="1" dirty="0" smtClean="0"/>
-              <a:t>/ </a:t>
-            </a:r>
-            <a:r>
-              <a:rPr lang="en-US" sz="2400" b="1" dirty="0" err="1"/>
-              <a:t>Σ</a:t>
-            </a:r>
-            <a:r>
-              <a:rPr lang="en-US" sz="2400" b="1" i="1" baseline="-25000" dirty="0" err="1"/>
-              <a:t>i</a:t>
-            </a:r>
-            <a:r>
-              <a:rPr lang="en-US" sz="2400" b="1" dirty="0"/>
-              <a:t> </a:t>
-            </a:r>
-            <a:r>
-              <a:rPr lang="en-US" sz="2400" b="1" i="1" dirty="0" err="1" smtClean="0"/>
-              <a:t>n</a:t>
-            </a:r>
-            <a:r>
-              <a:rPr lang="en-US" sz="2400" b="1" i="1" baseline="-25000" dirty="0" err="1" smtClean="0"/>
-              <a:t>i</a:t>
-            </a:r>
-            <a:r>
-              <a:rPr lang="en-US" sz="2400" b="1" dirty="0" smtClean="0"/>
-              <a:t> </a:t>
-            </a:r>
-            <a:endParaRPr lang="en-US" sz="2400" b="1" dirty="0"/>
-          </a:p>
-          <a:p>
-            <a:endParaRPr lang="en-US" sz="2400" dirty="0"/>
+              <a:t>are correct</a:t>
+            </a:r>
+            <a:r>
+              <a:rPr lang="en-US" sz="2400" dirty="0" smtClean="0"/>
+              <a:t>.</a:t>
+            </a:r>
+            <a:endParaRPr lang="en-US" sz="2400" dirty="0" smtClean="0"/>
           </a:p>
         </p:txBody>
       </p:sp>
@@ -13369,7 +13088,7 @@
         </p:nvSpPr>
         <p:spPr>
           <a:xfrm>
-            <a:off x="22791591" y="22545279"/>
+            <a:off x="22791591" y="23002479"/>
             <a:ext cx="4595611" cy="1015663"/>
           </a:xfrm>
           <a:prstGeom prst="rect">
@@ -13404,7 +13123,7 @@
         </p:nvSpPr>
         <p:spPr>
           <a:xfrm>
-            <a:off x="20515768" y="23497364"/>
+            <a:off x="20515768" y="23954564"/>
             <a:ext cx="720000" cy="720000"/>
           </a:xfrm>
           <a:prstGeom prst="ellipse">
@@ -13450,7 +13169,7 @@
         </p:nvSpPr>
         <p:spPr>
           <a:xfrm>
-            <a:off x="19998833" y="23530410"/>
+            <a:off x="19998833" y="23987610"/>
             <a:ext cx="1779073" cy="646331"/>
           </a:xfrm>
           <a:prstGeom prst="rect">
@@ -13483,7 +13202,7 @@
         </p:nvSpPr>
         <p:spPr>
           <a:xfrm>
-            <a:off x="20764069" y="23554229"/>
+            <a:off x="20764069" y="24011429"/>
             <a:ext cx="4595611" cy="584775"/>
           </a:xfrm>
           <a:prstGeom prst="rect">
@@ -13518,7 +13237,7 @@
         </p:nvSpPr>
         <p:spPr>
           <a:xfrm>
-            <a:off x="20517771" y="33815332"/>
+            <a:off x="20517771" y="34272532"/>
             <a:ext cx="720000" cy="720000"/>
           </a:xfrm>
           <a:prstGeom prst="ellipse">
@@ -13564,7 +13283,7 @@
         </p:nvSpPr>
         <p:spPr>
           <a:xfrm>
-            <a:off x="20000836" y="33848378"/>
+            <a:off x="20000836" y="34305578"/>
             <a:ext cx="1779073" cy="646331"/>
           </a:xfrm>
           <a:prstGeom prst="rect">
@@ -13597,7 +13316,7 @@
         </p:nvSpPr>
         <p:spPr>
           <a:xfrm>
-            <a:off x="21314511" y="33850932"/>
+            <a:off x="21314511" y="34308132"/>
             <a:ext cx="4864599" cy="584775"/>
           </a:xfrm>
           <a:prstGeom prst="rect">
@@ -13641,7 +13360,7 @@
         </p:nvSpPr>
         <p:spPr>
           <a:xfrm>
-            <a:off x="20539589" y="34556763"/>
+            <a:off x="20539589" y="35013963"/>
             <a:ext cx="9295460" cy="461665"/>
           </a:xfrm>
           <a:prstGeom prst="rect">
@@ -13656,15 +13375,7 @@
           <a:p>
             <a:r>
               <a:rPr lang="en-US" sz="2400" dirty="0" smtClean="0"/>
-              <a:t>The proposed system is </a:t>
-            </a:r>
-            <a:r>
-              <a:rPr lang="en-US" sz="2400" dirty="0" smtClean="0"/>
-              <a:t>integrated with the coreference </a:t>
-            </a:r>
-            <a:r>
-              <a:rPr lang="en-US" sz="2400" dirty="0" smtClean="0"/>
-              <a:t>resolution</a:t>
+              <a:t>The proposed system is integrated with the coreference resolution</a:t>
             </a:r>
             <a:endParaRPr lang="en-US" sz="2400" dirty="0"/>
           </a:p>
@@ -13678,7 +13389,7 @@
         </p:nvSpPr>
         <p:spPr>
           <a:xfrm>
-            <a:off x="20582120" y="24267970"/>
+            <a:off x="20582120" y="24725170"/>
             <a:ext cx="9274193" cy="461665"/>
           </a:xfrm>
           <a:prstGeom prst="rect">
@@ -13719,7 +13430,7 @@
         </p:nvSpPr>
         <p:spPr>
           <a:xfrm>
-            <a:off x="17178738" y="34931399"/>
+            <a:off x="17178738" y="35388599"/>
             <a:ext cx="12561934" cy="2677656"/>
           </a:xfrm>
           <a:prstGeom prst="rect">
@@ -13734,11 +13445,7 @@
           <a:p>
             <a:r>
               <a:rPr lang="en-US" sz="2400" dirty="0"/>
-              <a:t>system of Clark and Manning (2015), and its prediction threshold raised to 0.89, at which point </a:t>
-            </a:r>
-            <a:r>
-              <a:rPr lang="en-US" sz="2400" dirty="0"/>
-              <a:t>the precision on the validation set is 78.9. </a:t>
+              <a:t>system of Clark and Manning (2015), and its prediction threshold raised to 0.89, at which point the precision on the validation set is 78.9. </a:t>
             </a:r>
             <a:r>
               <a:rPr lang="en-US" sz="2400" dirty="0" smtClean="0"/>
@@ -13860,13 +13567,13 @@
           <p:nvPr>
             <p:extLst>
               <p:ext uri="{D42A27DB-BD31-4B8C-83A1-F6EECF244321}">
-                <p14:modId xmlns:p14="http://schemas.microsoft.com/office/powerpoint/2010/main" val="1836797808"/>
+                <p14:modId xmlns:p14="http://schemas.microsoft.com/office/powerpoint/2010/main" val="788811772"/>
               </p:ext>
             </p:extLst>
           </p:nvPr>
         </p:nvGraphicFramePr>
         <p:xfrm>
-          <a:off x="19188690" y="37810694"/>
+          <a:off x="19188690" y="38267894"/>
           <a:ext cx="8294277" cy="1676151"/>
         </p:xfrm>
         <a:graphic>
@@ -14261,7 +13968,7 @@
         </p:nvSpPr>
         <p:spPr>
           <a:xfrm>
-            <a:off x="17178738" y="39509242"/>
+            <a:off x="17178738" y="39966442"/>
             <a:ext cx="12561933" cy="1200329"/>
           </a:xfrm>
           <a:prstGeom prst="rect">
@@ -14274,6 +13981,7 @@
           </a:bodyPr>
           <a:lstStyle/>
           <a:p>
+            <a:pPr algn="ctr"/>
             <a:r>
               <a:rPr lang="en-US" sz="2400" dirty="0" smtClean="0"/>
               <a:t>(</a:t>
@@ -14284,11 +13992,11 @@
             </a:r>
             <a:r>
               <a:rPr lang="en-US" sz="2400" dirty="0" smtClean="0"/>
-              <a:t> metric scores for coreference resolution on the test portion of P&amp;P for the Clark and Manning (2015) system), with (CLARK + PROPOSED) and without (CLARK) the pairing </a:t>
+              <a:t> metric scores for coreference resolution on the test portion of P&amp;P for the Clark and Manning (2015) system), with (CLARK + PROPOSED) and without (CLARK) the pairing with the proposed system</a:t>
             </a:r>
             <a:r>
               <a:rPr lang="en-US" sz="2400" dirty="0" smtClean="0"/>
-              <a:t>with the proposed system.</a:t>
+              <a:t>.)</a:t>
             </a:r>
             <a:endParaRPr lang="en-US" sz="2400" dirty="0"/>
           </a:p>
@@ -14302,7 +14010,7 @@
         </p:nvSpPr>
         <p:spPr>
           <a:xfrm>
-            <a:off x="10977655" y="35604284"/>
+            <a:off x="10977655" y="36061484"/>
             <a:ext cx="5809329" cy="5693866"/>
           </a:xfrm>
           <a:prstGeom prst="rect">
@@ -14548,7 +14256,7 @@
         </p:nvSpPr>
         <p:spPr>
           <a:xfrm>
-            <a:off x="20440435" y="24802904"/>
+            <a:off x="20440435" y="25260104"/>
             <a:ext cx="470042" cy="400110"/>
           </a:xfrm>
           <a:prstGeom prst="rect">
@@ -14578,7 +14286,7 @@
         </p:nvSpPr>
         <p:spPr>
           <a:xfrm>
-            <a:off x="20443980" y="25082894"/>
+            <a:off x="20443980" y="25540094"/>
             <a:ext cx="470042" cy="400110"/>
           </a:xfrm>
           <a:prstGeom prst="rect">
@@ -14608,7 +14316,7 @@
         </p:nvSpPr>
         <p:spPr>
           <a:xfrm>
-            <a:off x="20426260" y="25362884"/>
+            <a:off x="20426260" y="25820084"/>
             <a:ext cx="470042" cy="400110"/>
           </a:xfrm>
           <a:prstGeom prst="rect">
@@ -14626,7 +14334,6 @@
               <a:rPr lang="en-US" sz="2000" dirty="0"/>
               <a:t>F</a:t>
             </a:r>
-            <a:endParaRPr lang="en-US" sz="2000" dirty="0"/>
           </a:p>
         </p:txBody>
       </p:sp>
@@ -14638,7 +14345,7 @@
         </p:nvCxnSpPr>
         <p:spPr>
           <a:xfrm>
-            <a:off x="20835901" y="24788783"/>
+            <a:off x="20835901" y="25245983"/>
             <a:ext cx="0" cy="7164000"/>
           </a:xfrm>
           <a:prstGeom prst="line">
@@ -14673,7 +14380,7 @@
         </p:nvSpPr>
         <p:spPr>
           <a:xfrm>
-            <a:off x="20844093" y="24852856"/>
+            <a:off x="20827764" y="25310056"/>
             <a:ext cx="1980000" cy="288000"/>
           </a:xfrm>
           <a:prstGeom prst="rect">
@@ -14722,7 +14429,7 @@
         </p:nvSpPr>
         <p:spPr>
           <a:xfrm>
-            <a:off x="20847638" y="25132846"/>
+            <a:off x="20831309" y="25590046"/>
             <a:ext cx="1620000" cy="288000"/>
           </a:xfrm>
           <a:prstGeom prst="rect">
@@ -14771,7 +14478,7 @@
         </p:nvSpPr>
         <p:spPr>
           <a:xfrm>
-            <a:off x="20829918" y="25412836"/>
+            <a:off x="20829918" y="25870036"/>
             <a:ext cx="1800000" cy="288000"/>
           </a:xfrm>
           <a:prstGeom prst="rect">
@@ -14820,7 +14527,7 @@
         </p:nvSpPr>
         <p:spPr>
           <a:xfrm>
-            <a:off x="22825673" y="24806448"/>
+            <a:off x="22825673" y="25263648"/>
             <a:ext cx="772510" cy="400110"/>
           </a:xfrm>
           <a:prstGeom prst="rect">
@@ -14850,7 +14557,7 @@
         </p:nvSpPr>
         <p:spPr>
           <a:xfrm>
-            <a:off x="22488978" y="25086438"/>
+            <a:off x="22488978" y="25543638"/>
             <a:ext cx="772510" cy="400110"/>
           </a:xfrm>
           <a:prstGeom prst="rect">
@@ -14880,7 +14587,7 @@
         </p:nvSpPr>
         <p:spPr>
           <a:xfrm>
-            <a:off x="22641378" y="25366428"/>
+            <a:off x="22641378" y="25823628"/>
             <a:ext cx="772510" cy="400110"/>
           </a:xfrm>
           <a:prstGeom prst="rect">
@@ -14910,7 +14617,7 @@
         </p:nvSpPr>
         <p:spPr>
           <a:xfrm>
-            <a:off x="20443980" y="25827171"/>
+            <a:off x="20443980" y="26284371"/>
             <a:ext cx="470042" cy="400110"/>
           </a:xfrm>
           <a:prstGeom prst="rect">
@@ -14940,7 +14647,7 @@
         </p:nvSpPr>
         <p:spPr>
           <a:xfrm>
-            <a:off x="20447525" y="26107161"/>
+            <a:off x="20447525" y="26564361"/>
             <a:ext cx="470042" cy="400110"/>
           </a:xfrm>
           <a:prstGeom prst="rect">
@@ -14970,7 +14677,7 @@
         </p:nvSpPr>
         <p:spPr>
           <a:xfrm>
-            <a:off x="20429805" y="26387151"/>
+            <a:off x="20429805" y="26844351"/>
             <a:ext cx="470042" cy="400110"/>
           </a:xfrm>
           <a:prstGeom prst="rect">
@@ -14988,7 +14695,6 @@
               <a:rPr lang="en-US" sz="2000" dirty="0"/>
               <a:t>F</a:t>
             </a:r>
-            <a:endParaRPr lang="en-US" sz="2000" dirty="0"/>
           </a:p>
         </p:txBody>
       </p:sp>
@@ -15000,7 +14706,7 @@
         </p:nvSpPr>
         <p:spPr>
           <a:xfrm>
-            <a:off x="20847638" y="25877123"/>
+            <a:off x="20831309" y="26334323"/>
             <a:ext cx="2196000" cy="288000"/>
           </a:xfrm>
           <a:prstGeom prst="rect">
@@ -15049,7 +14755,7 @@
         </p:nvSpPr>
         <p:spPr>
           <a:xfrm>
-            <a:off x="20829918" y="26157113"/>
+            <a:off x="20829918" y="26614313"/>
             <a:ext cx="2772000" cy="288000"/>
           </a:xfrm>
           <a:prstGeom prst="rect">
@@ -15098,7 +14804,7 @@
         </p:nvSpPr>
         <p:spPr>
           <a:xfrm>
-            <a:off x="20833463" y="26458368"/>
+            <a:off x="20833463" y="26915568"/>
             <a:ext cx="2448000" cy="288000"/>
           </a:xfrm>
           <a:prstGeom prst="rect">
@@ -15147,7 +14853,7 @@
         </p:nvSpPr>
         <p:spPr>
           <a:xfrm>
-            <a:off x="23063133" y="25830715"/>
+            <a:off x="23063133" y="26287915"/>
             <a:ext cx="772510" cy="400110"/>
           </a:xfrm>
           <a:prstGeom prst="rect">
@@ -15177,7 +14883,7 @@
         </p:nvSpPr>
         <p:spPr>
           <a:xfrm>
-            <a:off x="23619576" y="26110705"/>
+            <a:off x="23619576" y="26567905"/>
             <a:ext cx="772510" cy="400110"/>
           </a:xfrm>
           <a:prstGeom prst="rect">
@@ -15207,7 +14913,7 @@
         </p:nvSpPr>
         <p:spPr>
           <a:xfrm>
-            <a:off x="23304144" y="26411960"/>
+            <a:off x="23304144" y="26869160"/>
             <a:ext cx="772510" cy="400110"/>
           </a:xfrm>
           <a:prstGeom prst="rect">
@@ -15237,7 +14943,7 @@
         </p:nvSpPr>
         <p:spPr>
           <a:xfrm>
-            <a:off x="20426260" y="26872701"/>
+            <a:off x="20426260" y="27329901"/>
             <a:ext cx="470042" cy="400110"/>
           </a:xfrm>
           <a:prstGeom prst="rect">
@@ -15267,7 +14973,7 @@
         </p:nvSpPr>
         <p:spPr>
           <a:xfrm>
-            <a:off x="20429805" y="27152691"/>
+            <a:off x="20429805" y="27609891"/>
             <a:ext cx="470042" cy="400110"/>
           </a:xfrm>
           <a:prstGeom prst="rect">
@@ -15297,7 +15003,7 @@
         </p:nvSpPr>
         <p:spPr>
           <a:xfrm>
-            <a:off x="20412085" y="27432681"/>
+            <a:off x="20412085" y="27889881"/>
             <a:ext cx="470042" cy="400110"/>
           </a:xfrm>
           <a:prstGeom prst="rect">
@@ -15315,7 +15021,6 @@
               <a:rPr lang="en-US" sz="2000" dirty="0"/>
               <a:t>F</a:t>
             </a:r>
-            <a:endParaRPr lang="en-US" sz="2000" dirty="0"/>
           </a:p>
         </p:txBody>
       </p:sp>
@@ -15327,7 +15032,7 @@
         </p:nvSpPr>
         <p:spPr>
           <a:xfrm>
-            <a:off x="20829918" y="26922653"/>
+            <a:off x="20829918" y="27379853"/>
             <a:ext cx="1980000" cy="288000"/>
           </a:xfrm>
           <a:prstGeom prst="rect">
@@ -15376,7 +15081,7 @@
         </p:nvSpPr>
         <p:spPr>
           <a:xfrm>
-            <a:off x="20833463" y="27202643"/>
+            <a:off x="20833463" y="27659843"/>
             <a:ext cx="3564000" cy="288000"/>
           </a:xfrm>
           <a:prstGeom prst="rect">
@@ -15425,7 +15130,7 @@
         </p:nvSpPr>
         <p:spPr>
           <a:xfrm>
-            <a:off x="20837008" y="27503898"/>
+            <a:off x="20837008" y="27961098"/>
             <a:ext cx="2556000" cy="288000"/>
           </a:xfrm>
           <a:prstGeom prst="rect">
@@ -15474,7 +15179,7 @@
         </p:nvSpPr>
         <p:spPr>
           <a:xfrm>
-            <a:off x="22832757" y="26854980"/>
+            <a:off x="22832757" y="27312180"/>
             <a:ext cx="772510" cy="400110"/>
           </a:xfrm>
           <a:prstGeom prst="rect">
@@ -15504,7 +15209,7 @@
         </p:nvSpPr>
         <p:spPr>
           <a:xfrm>
-            <a:off x="24409927" y="27134970"/>
+            <a:off x="24409927" y="27592170"/>
             <a:ext cx="772510" cy="400110"/>
           </a:xfrm>
           <a:prstGeom prst="rect">
@@ -15534,7 +15239,7 @@
         </p:nvSpPr>
         <p:spPr>
           <a:xfrm>
-            <a:off x="23414013" y="27457490"/>
+            <a:off x="23414013" y="27914690"/>
             <a:ext cx="772510" cy="400110"/>
           </a:xfrm>
           <a:prstGeom prst="rect">
@@ -15564,7 +15269,7 @@
         </p:nvSpPr>
         <p:spPr>
           <a:xfrm>
-            <a:off x="20429805" y="27918233"/>
+            <a:off x="20429805" y="28375433"/>
             <a:ext cx="470042" cy="400110"/>
           </a:xfrm>
           <a:prstGeom prst="rect">
@@ -15594,7 +15299,7 @@
         </p:nvSpPr>
         <p:spPr>
           <a:xfrm>
-            <a:off x="20433350" y="28198223"/>
+            <a:off x="20433350" y="28655423"/>
             <a:ext cx="470042" cy="400110"/>
           </a:xfrm>
           <a:prstGeom prst="rect">
@@ -15624,7 +15329,7 @@
         </p:nvSpPr>
         <p:spPr>
           <a:xfrm>
-            <a:off x="20415630" y="28478213"/>
+            <a:off x="20415630" y="28935413"/>
             <a:ext cx="470042" cy="400110"/>
           </a:xfrm>
           <a:prstGeom prst="rect">
@@ -15642,7 +15347,6 @@
               <a:rPr lang="en-US" sz="2000" dirty="0"/>
               <a:t>F</a:t>
             </a:r>
-            <a:endParaRPr lang="en-US" sz="2000" dirty="0"/>
           </a:p>
         </p:txBody>
       </p:sp>
@@ -15654,7 +15358,7 @@
         </p:nvSpPr>
         <p:spPr>
           <a:xfrm>
-            <a:off x="20833463" y="27968185"/>
+            <a:off x="20833463" y="28425385"/>
             <a:ext cx="2772000" cy="288000"/>
           </a:xfrm>
           <a:prstGeom prst="rect">
@@ -15703,7 +15407,7 @@
         </p:nvSpPr>
         <p:spPr>
           <a:xfrm>
-            <a:off x="20837008" y="28269440"/>
+            <a:off x="20837008" y="28726640"/>
             <a:ext cx="2700000" cy="288000"/>
           </a:xfrm>
           <a:prstGeom prst="rect">
@@ -15752,7 +15456,7 @@
         </p:nvSpPr>
         <p:spPr>
           <a:xfrm>
-            <a:off x="20840553" y="28549430"/>
+            <a:off x="20840553" y="29006630"/>
             <a:ext cx="2736000" cy="288000"/>
           </a:xfrm>
           <a:prstGeom prst="rect">
@@ -15801,7 +15505,7 @@
         </p:nvSpPr>
         <p:spPr>
           <a:xfrm>
-            <a:off x="23623115" y="27900512"/>
+            <a:off x="23623115" y="28357712"/>
             <a:ext cx="772510" cy="400110"/>
           </a:xfrm>
           <a:prstGeom prst="rect">
@@ -15831,7 +15535,7 @@
         </p:nvSpPr>
         <p:spPr>
           <a:xfrm>
-            <a:off x="23541598" y="28201767"/>
+            <a:off x="23541598" y="28658967"/>
             <a:ext cx="772510" cy="400110"/>
           </a:xfrm>
           <a:prstGeom prst="rect">
@@ -15861,7 +15565,7 @@
         </p:nvSpPr>
         <p:spPr>
           <a:xfrm>
-            <a:off x="23608943" y="28503022"/>
+            <a:off x="23608943" y="28960222"/>
             <a:ext cx="772510" cy="400110"/>
           </a:xfrm>
           <a:prstGeom prst="rect">
@@ -15891,7 +15595,7 @@
         </p:nvSpPr>
         <p:spPr>
           <a:xfrm>
-            <a:off x="20412085" y="28963763"/>
+            <a:off x="20412085" y="29420963"/>
             <a:ext cx="470042" cy="400110"/>
           </a:xfrm>
           <a:prstGeom prst="rect">
@@ -15921,7 +15625,7 @@
         </p:nvSpPr>
         <p:spPr>
           <a:xfrm>
-            <a:off x="20415630" y="29243753"/>
+            <a:off x="20415630" y="29700953"/>
             <a:ext cx="470042" cy="400110"/>
           </a:xfrm>
           <a:prstGeom prst="rect">
@@ -15951,7 +15655,7 @@
         </p:nvSpPr>
         <p:spPr>
           <a:xfrm>
-            <a:off x="20397910" y="29523743"/>
+            <a:off x="20397910" y="29980943"/>
             <a:ext cx="470042" cy="400110"/>
           </a:xfrm>
           <a:prstGeom prst="rect">
@@ -15969,7 +15673,6 @@
               <a:rPr lang="en-US" sz="2000" dirty="0"/>
               <a:t>F</a:t>
             </a:r>
-            <a:endParaRPr lang="en-US" sz="2000" dirty="0"/>
           </a:p>
         </p:txBody>
       </p:sp>
@@ -15981,7 +15684,7 @@
         </p:nvSpPr>
         <p:spPr>
           <a:xfrm>
-            <a:off x="20837008" y="29013715"/>
+            <a:off x="20837008" y="29470915"/>
             <a:ext cx="3600000" cy="288000"/>
           </a:xfrm>
           <a:prstGeom prst="rect">
@@ -16030,7 +15733,7 @@
         </p:nvSpPr>
         <p:spPr>
           <a:xfrm>
-            <a:off x="20840553" y="29293705"/>
+            <a:off x="20840553" y="29750905"/>
             <a:ext cx="1620000" cy="288000"/>
           </a:xfrm>
           <a:prstGeom prst="rect">
@@ -16079,7 +15782,7 @@
         </p:nvSpPr>
         <p:spPr>
           <a:xfrm>
-            <a:off x="20844098" y="29573695"/>
+            <a:off x="20844098" y="30030895"/>
             <a:ext cx="2232000" cy="288000"/>
           </a:xfrm>
           <a:prstGeom prst="rect">
@@ -16128,7 +15831,7 @@
         </p:nvSpPr>
         <p:spPr>
           <a:xfrm>
-            <a:off x="24455999" y="28946042"/>
+            <a:off x="24455999" y="29403242"/>
             <a:ext cx="772510" cy="400110"/>
           </a:xfrm>
           <a:prstGeom prst="rect">
@@ -16158,7 +15861,7 @@
         </p:nvSpPr>
         <p:spPr>
           <a:xfrm>
-            <a:off x="22481890" y="29247297"/>
+            <a:off x="22481890" y="29704497"/>
             <a:ext cx="772510" cy="400110"/>
           </a:xfrm>
           <a:prstGeom prst="rect">
@@ -16188,7 +15891,7 @@
         </p:nvSpPr>
         <p:spPr>
           <a:xfrm>
-            <a:off x="23102123" y="29527287"/>
+            <a:off x="23102123" y="29984487"/>
             <a:ext cx="772510" cy="400110"/>
           </a:xfrm>
           <a:prstGeom prst="rect">
@@ -16218,7 +15921,7 @@
         </p:nvSpPr>
         <p:spPr>
           <a:xfrm>
-            <a:off x="20415630" y="29966763"/>
+            <a:off x="20415630" y="30423963"/>
             <a:ext cx="470042" cy="400110"/>
           </a:xfrm>
           <a:prstGeom prst="rect">
@@ -16248,7 +15951,7 @@
         </p:nvSpPr>
         <p:spPr>
           <a:xfrm>
-            <a:off x="20419175" y="30246753"/>
+            <a:off x="20419175" y="30703953"/>
             <a:ext cx="470042" cy="400110"/>
           </a:xfrm>
           <a:prstGeom prst="rect">
@@ -16278,7 +15981,7 @@
         </p:nvSpPr>
         <p:spPr>
           <a:xfrm>
-            <a:off x="20401455" y="30526743"/>
+            <a:off x="20401455" y="30983943"/>
             <a:ext cx="470042" cy="400110"/>
           </a:xfrm>
           <a:prstGeom prst="rect">
@@ -16296,7 +15999,6 @@
               <a:rPr lang="en-US" sz="2000" dirty="0"/>
               <a:t>F</a:t>
             </a:r>
-            <a:endParaRPr lang="en-US" sz="2000" dirty="0"/>
           </a:p>
         </p:txBody>
       </p:sp>
@@ -16308,7 +16010,7 @@
         </p:nvSpPr>
         <p:spPr>
           <a:xfrm>
-            <a:off x="20840553" y="30016715"/>
+            <a:off x="20840553" y="30473915"/>
             <a:ext cx="4320000" cy="288000"/>
           </a:xfrm>
           <a:prstGeom prst="rect">
@@ -16357,7 +16059,7 @@
         </p:nvSpPr>
         <p:spPr>
           <a:xfrm>
-            <a:off x="20844098" y="30296705"/>
+            <a:off x="20844098" y="30753905"/>
             <a:ext cx="900000" cy="288000"/>
           </a:xfrm>
           <a:prstGeom prst="rect">
@@ -16406,7 +16108,7 @@
         </p:nvSpPr>
         <p:spPr>
           <a:xfrm>
-            <a:off x="20847643" y="30576695"/>
+            <a:off x="20847643" y="31033895"/>
             <a:ext cx="1512000" cy="288000"/>
           </a:xfrm>
           <a:prstGeom prst="rect">
@@ -16455,7 +16157,7 @@
         </p:nvSpPr>
         <p:spPr>
           <a:xfrm>
-            <a:off x="25182554" y="29970307"/>
+            <a:off x="25182554" y="30427507"/>
             <a:ext cx="772510" cy="400110"/>
           </a:xfrm>
           <a:prstGeom prst="rect">
@@ -16493,7 +16195,7 @@
         </p:nvSpPr>
         <p:spPr>
           <a:xfrm>
-            <a:off x="21783684" y="30250297"/>
+            <a:off x="21783684" y="30707497"/>
             <a:ext cx="772510" cy="400110"/>
           </a:xfrm>
           <a:prstGeom prst="rect">
@@ -16523,7 +16225,7 @@
         </p:nvSpPr>
         <p:spPr>
           <a:xfrm>
-            <a:off x="22361393" y="30530287"/>
+            <a:off x="22361393" y="30987487"/>
             <a:ext cx="772510" cy="400110"/>
           </a:xfrm>
           <a:prstGeom prst="rect">
@@ -16553,7 +16255,7 @@
         </p:nvSpPr>
         <p:spPr>
           <a:xfrm>
-            <a:off x="20419175" y="30969764"/>
+            <a:off x="20419175" y="31426964"/>
             <a:ext cx="470042" cy="400110"/>
           </a:xfrm>
           <a:prstGeom prst="rect">
@@ -16583,7 +16285,7 @@
         </p:nvSpPr>
         <p:spPr>
           <a:xfrm>
-            <a:off x="20422720" y="31249754"/>
+            <a:off x="20422720" y="31706954"/>
             <a:ext cx="470042" cy="400110"/>
           </a:xfrm>
           <a:prstGeom prst="rect">
@@ -16613,7 +16315,7 @@
         </p:nvSpPr>
         <p:spPr>
           <a:xfrm>
-            <a:off x="20405000" y="31551009"/>
+            <a:off x="20405000" y="32008209"/>
             <a:ext cx="470042" cy="400110"/>
           </a:xfrm>
           <a:prstGeom prst="rect">
@@ -16631,7 +16333,6 @@
               <a:rPr lang="en-US" sz="2000" dirty="0"/>
               <a:t>F</a:t>
             </a:r>
-            <a:endParaRPr lang="en-US" sz="2000" dirty="0"/>
           </a:p>
         </p:txBody>
       </p:sp>
@@ -16645,7 +16346,7 @@
         </p:nvSpPr>
         <p:spPr>
           <a:xfrm rot="1206235">
-            <a:off x="24386460" y="30675722"/>
+            <a:off x="24386460" y="31132922"/>
             <a:ext cx="1620000" cy="1620000"/>
           </a:xfrm>
           <a:prstGeom prst="star8">
@@ -16691,7 +16392,7 @@
         </p:nvSpPr>
         <p:spPr>
           <a:xfrm>
-            <a:off x="20844098" y="31019716"/>
+            <a:off x="20844098" y="31476916"/>
             <a:ext cx="3852000" cy="288000"/>
           </a:xfrm>
           <a:prstGeom prst="rect">
@@ -16740,7 +16441,7 @@
         </p:nvSpPr>
         <p:spPr>
           <a:xfrm>
-            <a:off x="20847643" y="31299706"/>
+            <a:off x="20847643" y="31756906"/>
             <a:ext cx="4140000" cy="288000"/>
           </a:xfrm>
           <a:prstGeom prst="rect">
@@ -16789,7 +16490,7 @@
         </p:nvSpPr>
         <p:spPr>
           <a:xfrm>
-            <a:off x="20829923" y="31579696"/>
+            <a:off x="20829923" y="32036896"/>
             <a:ext cx="4032000" cy="288000"/>
           </a:xfrm>
           <a:prstGeom prst="rect">
@@ -16838,7 +16539,7 @@
         </p:nvSpPr>
         <p:spPr>
           <a:xfrm>
-            <a:off x="24718258" y="30952043"/>
+            <a:off x="24718258" y="31409243"/>
             <a:ext cx="772510" cy="400110"/>
           </a:xfrm>
           <a:prstGeom prst="rect">
@@ -16868,7 +16569,7 @@
         </p:nvSpPr>
         <p:spPr>
           <a:xfrm>
-            <a:off x="24998249" y="31253298"/>
+            <a:off x="24998249" y="31710498"/>
             <a:ext cx="772510" cy="400110"/>
           </a:xfrm>
           <a:prstGeom prst="rect">
@@ -16906,7 +16607,7 @@
         </p:nvSpPr>
         <p:spPr>
           <a:xfrm>
-            <a:off x="24874213" y="31533288"/>
+            <a:off x="24874213" y="31990488"/>
             <a:ext cx="772510" cy="400110"/>
           </a:xfrm>
           <a:prstGeom prst="rect">
@@ -16944,7 +16645,7 @@
         </p:nvSpPr>
         <p:spPr>
           <a:xfrm>
-            <a:off x="26504058" y="24747102"/>
+            <a:off x="26504058" y="25204302"/>
             <a:ext cx="3330990" cy="830997"/>
           </a:xfrm>
           <a:prstGeom prst="rect">
@@ -16959,11 +16660,7 @@
           <a:p>
             <a:r>
               <a:rPr lang="en-US" sz="2400" dirty="0" smtClean="0"/>
-              <a:t>Predicts </a:t>
-            </a:r>
-            <a:r>
-              <a:rPr lang="en-US" sz="2400" dirty="0" smtClean="0"/>
-              <a:t>the most recent </a:t>
+              <a:t>Predicts the most recent </a:t>
             </a:r>
             <a:r>
               <a:rPr lang="en-US" sz="2400" dirty="0"/>
@@ -16971,17 +16668,8 @@
             </a:r>
             <a:r>
               <a:rPr lang="en-US" sz="2400" dirty="0" smtClean="0"/>
-              <a:t> </a:t>
-            </a:r>
-            <a:r>
-              <a:rPr lang="en-US" sz="2400" dirty="0" smtClean="0"/>
-              <a:t>mentions</a:t>
-            </a:r>
-            <a:r>
-              <a:rPr lang="en-US" sz="2400" dirty="0" smtClean="0"/>
-              <a:t>.</a:t>
-            </a:r>
-            <a:endParaRPr lang="en-US" sz="2400" dirty="0" smtClean="0"/>
+              <a:t> mentions.</a:t>
+            </a:r>
           </a:p>
         </p:txBody>
       </p:sp>
@@ -16995,7 +16683,7 @@
         </p:nvSpPr>
         <p:spPr>
           <a:xfrm>
-            <a:off x="26162226" y="24854494"/>
+            <a:off x="26162226" y="25311694"/>
             <a:ext cx="288000" cy="288000"/>
           </a:xfrm>
           <a:prstGeom prst="rect">
@@ -17044,7 +16732,7 @@
         </p:nvSpPr>
         <p:spPr>
           <a:xfrm>
-            <a:off x="26510804" y="25472213"/>
+            <a:off x="26510804" y="25929413"/>
             <a:ext cx="3324244" cy="830997"/>
           </a:xfrm>
           <a:prstGeom prst="rect">
@@ -17059,25 +16747,8 @@
           <a:p>
             <a:r>
               <a:rPr lang="en-US" sz="2400" dirty="0" smtClean="0"/>
-              <a:t>Predicts </a:t>
-            </a:r>
-            <a:r>
-              <a:rPr lang="en-US" sz="2400" dirty="0" smtClean="0"/>
-              <a:t>the most recent 3</a:t>
-            </a:r>
-            <a:r>
-              <a:rPr lang="en-US" sz="2400" dirty="0" smtClean="0"/>
-              <a:t> </a:t>
-            </a:r>
-            <a:r>
-              <a:rPr lang="en-US" sz="2400" dirty="0" smtClean="0"/>
-              <a:t>mentions</a:t>
-            </a:r>
-            <a:r>
-              <a:rPr lang="en-US" sz="2400" dirty="0" smtClean="0"/>
-              <a:t>.</a:t>
-            </a:r>
-            <a:endParaRPr lang="en-US" sz="2400" dirty="0" smtClean="0"/>
+              <a:t>Predicts the most recent 3 mentions.</a:t>
+            </a:r>
           </a:p>
         </p:txBody>
       </p:sp>
@@ -17091,7 +16762,7 @@
         </p:nvSpPr>
         <p:spPr>
           <a:xfrm>
-            <a:off x="26168972" y="25579605"/>
+            <a:off x="26168972" y="26036805"/>
             <a:ext cx="288000" cy="288000"/>
           </a:xfrm>
           <a:prstGeom prst="rect">
@@ -17140,7 +16811,7 @@
         </p:nvSpPr>
         <p:spPr>
           <a:xfrm>
-            <a:off x="26514349" y="26177503"/>
+            <a:off x="26514349" y="26634703"/>
             <a:ext cx="3341964" cy="830997"/>
           </a:xfrm>
           <a:prstGeom prst="rect">
@@ -17155,25 +16826,8 @@
           <a:p>
             <a:r>
               <a:rPr lang="en-US" sz="2400" dirty="0" smtClean="0"/>
-              <a:t>Predicts </a:t>
-            </a:r>
-            <a:r>
-              <a:rPr lang="en-US" sz="2400" dirty="0" smtClean="0"/>
-              <a:t>the most recent </a:t>
-            </a:r>
-            <a:r>
-              <a:rPr lang="en-US" sz="2400" dirty="0" smtClean="0"/>
-              <a:t>4 </a:t>
-            </a:r>
-            <a:r>
-              <a:rPr lang="en-US" sz="2400" dirty="0" smtClean="0"/>
-              <a:t>mentions</a:t>
-            </a:r>
-            <a:r>
-              <a:rPr lang="en-US" sz="2400" dirty="0" smtClean="0"/>
-              <a:t>.</a:t>
-            </a:r>
-            <a:endParaRPr lang="en-US" sz="2400" dirty="0" smtClean="0"/>
+              <a:t>Predicts the most recent 4 mentions.</a:t>
+            </a:r>
           </a:p>
         </p:txBody>
       </p:sp>
@@ -17187,7 +16841,7 @@
         </p:nvSpPr>
         <p:spPr>
           <a:xfrm>
-            <a:off x="26172517" y="26284895"/>
+            <a:off x="26172517" y="26742095"/>
             <a:ext cx="288000" cy="288000"/>
           </a:xfrm>
           <a:prstGeom prst="rect">
@@ -17236,7 +16890,7 @@
         </p:nvSpPr>
         <p:spPr>
           <a:xfrm>
-            <a:off x="26517894" y="26904058"/>
+            <a:off x="26517894" y="27361258"/>
             <a:ext cx="3316683" cy="1200329"/>
           </a:xfrm>
           <a:prstGeom prst="rect">
@@ -17253,7 +16907,6 @@
               <a:rPr lang="en-US" sz="2400" dirty="0" smtClean="0"/>
               <a:t>Randomly predicts mentions in a 5-sentence pre-window</a:t>
             </a:r>
-            <a:endParaRPr lang="en-US" sz="2400" dirty="0" smtClean="0"/>
           </a:p>
         </p:txBody>
       </p:sp>
@@ -17267,7 +16920,7 @@
         </p:nvSpPr>
         <p:spPr>
           <a:xfrm>
-            <a:off x="26176062" y="27011450"/>
+            <a:off x="26176062" y="27468650"/>
             <a:ext cx="288000" cy="288000"/>
           </a:xfrm>
           <a:prstGeom prst="rect">
@@ -17316,7 +16969,7 @@
         </p:nvSpPr>
         <p:spPr>
           <a:xfrm>
-            <a:off x="26521439" y="27992118"/>
+            <a:off x="26521439" y="28449318"/>
             <a:ext cx="3313138" cy="1200329"/>
           </a:xfrm>
           <a:prstGeom prst="rect">
@@ -17333,7 +16986,6 @@
               <a:rPr lang="en-US" sz="2400" dirty="0" smtClean="0"/>
               <a:t>A simple rule-based method (See the paper for details).</a:t>
             </a:r>
-            <a:endParaRPr lang="en-US" sz="2400" dirty="0" smtClean="0"/>
           </a:p>
         </p:txBody>
       </p:sp>
@@ -17347,7 +16999,7 @@
         </p:nvSpPr>
         <p:spPr>
           <a:xfrm>
-            <a:off x="26179607" y="28099510"/>
+            <a:off x="26179607" y="28556710"/>
             <a:ext cx="288000" cy="288000"/>
           </a:xfrm>
           <a:prstGeom prst="rect">
@@ -17396,7 +17048,7 @@
         </p:nvSpPr>
         <p:spPr>
           <a:xfrm>
-            <a:off x="26524984" y="29080178"/>
+            <a:off x="26524984" y="29537378"/>
             <a:ext cx="3309593" cy="1938992"/>
           </a:xfrm>
           <a:prstGeom prst="rect">
@@ -17411,9 +17063,16 @@
           <a:p>
             <a:r>
               <a:rPr lang="en-US" sz="2400" dirty="0" smtClean="0"/>
-              <a:t>The system described in Lee et al. (2011), which performs m-anaphor resolution for conjunctive cases.</a:t>
-            </a:r>
-            <a:endParaRPr lang="en-US" sz="2400" dirty="0" smtClean="0"/>
+              <a:t>The system described in Lee et al. (2011), which performs m-anaphor resolution </a:t>
+            </a:r>
+            <a:r>
+              <a:rPr lang="en-US" sz="2400" dirty="0" smtClean="0"/>
+              <a:t>solely for </a:t>
+            </a:r>
+            <a:r>
+              <a:rPr lang="en-US" sz="2400" dirty="0" smtClean="0"/>
+              <a:t>conjunctive cases.</a:t>
+            </a:r>
           </a:p>
         </p:txBody>
       </p:sp>
@@ -17427,7 +17086,7 @@
         </p:nvSpPr>
         <p:spPr>
           <a:xfrm>
-            <a:off x="26183152" y="29187570"/>
+            <a:off x="26183152" y="29644770"/>
             <a:ext cx="288000" cy="288000"/>
           </a:xfrm>
           <a:prstGeom prst="rect">
@@ -17476,7 +17135,7 @@
         </p:nvSpPr>
         <p:spPr>
           <a:xfrm>
-            <a:off x="26484125" y="30892673"/>
+            <a:off x="26484125" y="31349873"/>
             <a:ext cx="3372188" cy="830997"/>
           </a:xfrm>
           <a:prstGeom prst="rect">
@@ -17507,7 +17166,7 @@
         </p:nvSpPr>
         <p:spPr>
           <a:xfrm>
-            <a:off x="26163558" y="31000065"/>
+            <a:off x="26163558" y="31457265"/>
             <a:ext cx="288000" cy="288000"/>
           </a:xfrm>
           <a:prstGeom prst="rect">
@@ -17556,7 +17215,7 @@
         </p:nvSpPr>
         <p:spPr>
           <a:xfrm flipH="1">
-            <a:off x="20500605" y="32325068"/>
+            <a:off x="20500605" y="32782268"/>
             <a:ext cx="9240066" cy="1274892"/>
           </a:xfrm>
           <a:prstGeom prst="wedgeRoundRectCallout">
@@ -17606,7 +17265,7 @@
         </p:nvSpPr>
         <p:spPr>
           <a:xfrm>
-            <a:off x="20583251" y="32374338"/>
+            <a:off x="20583251" y="32831538"/>
             <a:ext cx="9274193" cy="1200329"/>
           </a:xfrm>
           <a:prstGeom prst="rect">
@@ -17621,9 +17280,478 @@
           <a:p>
             <a:r>
               <a:rPr lang="en-US" sz="2400" dirty="0" smtClean="0"/>
-              <a:t>The proposed system outperforms all other systems, but exhibits a bias towards 2-anaphors, recent mentions, and mentions coordinated by conjunction. This is not surprising given such cases are easiest to resolve.</a:t>
+              <a:t>The proposed system outperforms all other systems, but exhibits a bias towards 2-anaphors, recent mentions, and mentions coordinated by conjunction. This is not surprising given such cases are easiest to </a:t>
+            </a:r>
+            <a:r>
+              <a:rPr lang="en-US" sz="2400" dirty="0" smtClean="0"/>
+              <a:t>resolve!</a:t>
             </a:r>
             <a:endParaRPr lang="en-US" sz="2400" dirty="0"/>
+          </a:p>
+        </p:txBody>
+      </p:sp>
+      <p:sp>
+        <p:nvSpPr>
+          <p:cNvPr id="330" name="TextBox 329"/>
+          <p:cNvSpPr txBox="1"/>
+          <p:nvPr/>
+        </p:nvSpPr>
+        <p:spPr>
+          <a:xfrm>
+            <a:off x="6565278" y="42097576"/>
+            <a:ext cx="16239702" cy="646331"/>
+          </a:xfrm>
+          <a:prstGeom prst="rect">
+            <a:avLst/>
+          </a:prstGeom>
+          <a:noFill/>
+        </p:spPr>
+        <p:txBody>
+          <a:bodyPr wrap="none" rtlCol="0">
+            <a:spAutoFit/>
+          </a:bodyPr>
+          <a:lstStyle/>
+          <a:p>
+            <a:r>
+              <a:rPr lang="en-US" sz="3600" b="1" dirty="0" smtClean="0">
+                <a:solidFill>
+                  <a:srgbClr val="F1F9E7"/>
+                </a:solidFill>
+                <a:ea typeface="Big Caslon Medium" charset="0"/>
+                <a:cs typeface="Big Caslon Medium" charset="0"/>
+              </a:rPr>
+              <a:t>Software and Data: </a:t>
+            </a:r>
+            <a:r>
+              <a:rPr lang="en-US" sz="3600" b="1" dirty="0">
+                <a:solidFill>
+                  <a:srgbClr val="F1F9E7"/>
+                </a:solidFill>
+              </a:rPr>
+              <a:t>http://</a:t>
+            </a:r>
+            <a:r>
+              <a:rPr lang="en-US" sz="3600" b="1" dirty="0" err="1">
+                <a:solidFill>
+                  <a:srgbClr val="F1F9E7"/>
+                </a:solidFill>
+              </a:rPr>
+              <a:t>www.github.com</a:t>
+            </a:r>
+            <a:r>
+              <a:rPr lang="en-US" sz="3600" b="1" dirty="0">
+                <a:solidFill>
+                  <a:srgbClr val="F1F9E7"/>
+                </a:solidFill>
+              </a:rPr>
+              <a:t>/ </a:t>
+            </a:r>
+            <a:r>
+              <a:rPr lang="en-US" sz="3600" b="1" dirty="0" err="1">
+                <a:solidFill>
+                  <a:srgbClr val="F1F9E7"/>
+                </a:solidFill>
+              </a:rPr>
+              <a:t>networkdynamics</a:t>
+            </a:r>
+            <a:r>
+              <a:rPr lang="en-US" sz="3600" b="1" dirty="0">
+                <a:solidFill>
+                  <a:srgbClr val="F1F9E7"/>
+                </a:solidFill>
+              </a:rPr>
+              <a:t>/manaphor-acl2016 </a:t>
+            </a:r>
+            <a:endParaRPr lang="en-US" sz="3600" b="1" dirty="0">
+              <a:solidFill>
+                <a:srgbClr val="F1F9E7"/>
+              </a:solidFill>
+            </a:endParaRPr>
+          </a:p>
+        </p:txBody>
+      </p:sp>
+      <p:pic>
+        <p:nvPicPr>
+          <p:cNvPr id="3" name="Picture 2"/>
+          <p:cNvPicPr>
+            <a:picLocks noChangeAspect="1"/>
+          </p:cNvPicPr>
+          <p:nvPr/>
+        </p:nvPicPr>
+        <p:blipFill>
+          <a:blip r:embed="rId7">
+            <a:alphaModFix amt="30000"/>
+          </a:blip>
+          <a:stretch>
+            <a:fillRect/>
+          </a:stretch>
+        </p:blipFill>
+        <p:spPr>
+          <a:xfrm>
+            <a:off x="28648502" y="6502176"/>
+            <a:ext cx="923984" cy="1518659"/>
+          </a:xfrm>
+          <a:prstGeom prst="rect">
+            <a:avLst/>
+          </a:prstGeom>
+        </p:spPr>
+      </p:pic>
+      <p:pic>
+        <p:nvPicPr>
+          <p:cNvPr id="9" name="Picture 8"/>
+          <p:cNvPicPr>
+            <a:picLocks noChangeAspect="1"/>
+          </p:cNvPicPr>
+          <p:nvPr/>
+        </p:nvPicPr>
+        <p:blipFill>
+          <a:blip r:embed="rId8">
+            <a:alphaModFix amt="30000"/>
+          </a:blip>
+          <a:stretch>
+            <a:fillRect/>
+          </a:stretch>
+        </p:blipFill>
+        <p:spPr>
+          <a:xfrm>
+            <a:off x="28383810" y="8196159"/>
+            <a:ext cx="1223185" cy="1853596"/>
+          </a:xfrm>
+          <a:prstGeom prst="rect">
+            <a:avLst/>
+          </a:prstGeom>
+        </p:spPr>
+      </p:pic>
+      <p:sp>
+        <p:nvSpPr>
+          <p:cNvPr id="315" name="Rectangle 314"/>
+          <p:cNvSpPr/>
+          <p:nvPr/>
+        </p:nvSpPr>
+        <p:spPr>
+          <a:xfrm>
+            <a:off x="20552833" y="5922659"/>
+            <a:ext cx="9086362" cy="4524315"/>
+          </a:xfrm>
+          <a:prstGeom prst="rect">
+            <a:avLst/>
+          </a:prstGeom>
+        </p:spPr>
+        <p:txBody>
+          <a:bodyPr wrap="square">
+            <a:spAutoFit/>
+          </a:bodyPr>
+          <a:lstStyle/>
+          <a:p>
+            <a:r>
+              <a:rPr lang="en-US" sz="2400" dirty="0"/>
+              <a:t>Our dataset comprises </a:t>
+            </a:r>
+            <a:r>
+              <a:rPr lang="en-US" sz="2400" dirty="0" smtClean="0"/>
+              <a:t>of,</a:t>
+            </a:r>
+          </a:p>
+          <a:p>
+            <a:endParaRPr lang="en-US" sz="2400" dirty="0" smtClean="0"/>
+          </a:p>
+          <a:p>
+            <a:pPr marL="342900" indent="-342900">
+              <a:buFont typeface="Arial" charset="0"/>
+              <a:buChar char="•"/>
+            </a:pPr>
+            <a:r>
+              <a:rPr lang="en-US" sz="2400" dirty="0"/>
+              <a:t>T</a:t>
+            </a:r>
+            <a:r>
+              <a:rPr lang="en-US" sz="2400" dirty="0" smtClean="0"/>
+              <a:t>he </a:t>
+            </a:r>
+            <a:r>
+              <a:rPr lang="en-US" sz="2400" b="1" i="1" dirty="0"/>
+              <a:t>Pride and Prejudice </a:t>
+            </a:r>
+            <a:r>
+              <a:rPr lang="en-US" sz="2400" b="1" dirty="0"/>
+              <a:t>novel (P&amp;P) </a:t>
+            </a:r>
+            <a:r>
+              <a:rPr lang="en-US" sz="2400" dirty="0"/>
+              <a:t>(121440 </a:t>
+            </a:r>
+            <a:r>
+              <a:rPr lang="en-US" sz="2400" dirty="0" smtClean="0"/>
+              <a:t>words) with </a:t>
+            </a:r>
+            <a:r>
+              <a:rPr lang="en-US" sz="2400" dirty="0"/>
+              <a:t>all mentions of character </a:t>
+            </a:r>
+            <a:r>
+              <a:rPr lang="en-US" sz="2400" dirty="0" smtClean="0"/>
+              <a:t>fully </a:t>
+            </a:r>
+            <a:r>
+              <a:rPr lang="en-US" sz="2400" dirty="0"/>
+              <a:t>resolved to their antecedents, including mentions referencing multiple characters. </a:t>
+            </a:r>
+            <a:endParaRPr lang="en-US" sz="2400" dirty="0" smtClean="0"/>
+          </a:p>
+          <a:p>
+            <a:pPr marL="342900" indent="-342900">
+              <a:buFont typeface="Arial" charset="0"/>
+              <a:buChar char="•"/>
+            </a:pPr>
+            <a:endParaRPr lang="en-US" sz="2400" dirty="0" smtClean="0"/>
+          </a:p>
+          <a:p>
+            <a:pPr marL="342900" indent="-342900">
+              <a:buFont typeface="Arial" charset="0"/>
+              <a:buChar char="•"/>
+            </a:pPr>
+            <a:r>
+              <a:rPr lang="en-US" sz="2400" dirty="0" smtClean="0"/>
+              <a:t>36 </a:t>
+            </a:r>
+            <a:r>
+              <a:rPr lang="en-US" sz="2400" dirty="0"/>
+              <a:t>short </a:t>
+            </a:r>
+            <a:r>
+              <a:rPr lang="en-US" sz="2400" dirty="0" smtClean="0"/>
+              <a:t>stories </a:t>
+            </a:r>
+            <a:r>
+              <a:rPr lang="en-US" sz="2400" dirty="0"/>
+              <a:t>from the </a:t>
+            </a:r>
+            <a:r>
+              <a:rPr lang="en-US" sz="2400" b="1" i="1" dirty="0"/>
+              <a:t>Scribner Anthology of Contemporary Short Fiction </a:t>
+            </a:r>
+            <a:r>
+              <a:rPr lang="en-US" sz="2400" dirty="0"/>
+              <a:t>(</a:t>
+            </a:r>
+            <a:r>
+              <a:rPr lang="en-US" sz="2400" dirty="0" err="1"/>
+              <a:t>Martone</a:t>
+            </a:r>
+            <a:r>
+              <a:rPr lang="en-US" sz="2400" dirty="0"/>
+              <a:t> et al., 1999) </a:t>
+            </a:r>
+            <a:r>
+              <a:rPr lang="en-US" sz="2400" b="1" dirty="0"/>
+              <a:t>(Scribner)</a:t>
+            </a:r>
+            <a:r>
+              <a:rPr lang="en-US" sz="2400" dirty="0"/>
+              <a:t> (</a:t>
+            </a:r>
+            <a:r>
+              <a:rPr lang="en-US" sz="2400" dirty="0" smtClean="0"/>
+              <a:t>total </a:t>
+            </a:r>
+            <a:r>
+              <a:rPr lang="en-US" sz="2400" dirty="0"/>
+              <a:t>of 216901 words), representing an eclectic </a:t>
+            </a:r>
+            <a:r>
+              <a:rPr lang="en-US" sz="2400" dirty="0" smtClean="0"/>
+              <a:t>collection </a:t>
+            </a:r>
+            <a:r>
+              <a:rPr lang="en-US" sz="2400" dirty="0"/>
+              <a:t>of stories from the modern era. A</a:t>
+            </a:r>
+            <a:r>
+              <a:rPr lang="en-US" sz="2400" dirty="0" smtClean="0"/>
+              <a:t>ll </a:t>
+            </a:r>
+            <a:r>
+              <a:rPr lang="en-US" sz="2400" dirty="0"/>
+              <a:t>mentions of </a:t>
+            </a:r>
+            <a:r>
+              <a:rPr lang="en-US" sz="2400" i="1" dirty="0"/>
+              <a:t>they </a:t>
+            </a:r>
+            <a:r>
+              <a:rPr lang="en-US" sz="2400" dirty="0"/>
+              <a:t>and </a:t>
+            </a:r>
+            <a:r>
+              <a:rPr lang="en-US" sz="2400" i="1" dirty="0"/>
+              <a:t>them </a:t>
+            </a:r>
+            <a:r>
+              <a:rPr lang="en-US" sz="2400" dirty="0" smtClean="0"/>
+              <a:t>have been resolved (</a:t>
+            </a:r>
+            <a:r>
+              <a:rPr lang="en-US" sz="2400" i="1" dirty="0" smtClean="0"/>
+              <a:t>m</a:t>
+            </a:r>
+            <a:r>
+              <a:rPr lang="en-US" sz="2400" dirty="0" smtClean="0"/>
+              <a:t>-anaphoric, 1-anaphoric, and singleton), </a:t>
+            </a:r>
+            <a:r>
+              <a:rPr lang="en-US" sz="2400" dirty="0"/>
+              <a:t>including those of </a:t>
+            </a:r>
+            <a:r>
+              <a:rPr lang="en-US" sz="2400" dirty="0" smtClean="0"/>
+              <a:t>non-person </a:t>
+            </a:r>
+            <a:r>
+              <a:rPr lang="en-US" sz="2400" dirty="0"/>
+              <a:t>entities. </a:t>
+            </a:r>
+          </a:p>
+          <a:p>
+            <a:endParaRPr lang="en-US" sz="2400" dirty="0"/>
+          </a:p>
+        </p:txBody>
+      </p:sp>
+      <p:sp>
+        <p:nvSpPr>
+          <p:cNvPr id="331" name="Rectangle 330"/>
+          <p:cNvSpPr/>
+          <p:nvPr/>
+        </p:nvSpPr>
+        <p:spPr>
+          <a:xfrm>
+            <a:off x="20545265" y="22000448"/>
+            <a:ext cx="8203893" cy="830997"/>
+          </a:xfrm>
+          <a:prstGeom prst="rect">
+            <a:avLst/>
+          </a:prstGeom>
+        </p:spPr>
+        <p:txBody>
+          <a:bodyPr wrap="square">
+            <a:spAutoFit/>
+          </a:bodyPr>
+          <a:lstStyle/>
+          <a:p>
+            <a:r>
+              <a:rPr lang="en-US" sz="2400" b="1" dirty="0" smtClean="0"/>
+              <a:t>Precision </a:t>
+            </a:r>
+            <a:r>
+              <a:rPr lang="en-US" sz="2400" b="1" dirty="0" smtClean="0"/>
+              <a:t>= </a:t>
+            </a:r>
+            <a:r>
+              <a:rPr lang="en-US" sz="2400" b="1" dirty="0" err="1" smtClean="0"/>
+              <a:t>Σ</a:t>
+            </a:r>
+            <a:r>
+              <a:rPr lang="en-US" sz="2400" b="1" i="1" baseline="-25000" dirty="0" err="1" smtClean="0"/>
+              <a:t>i</a:t>
+            </a:r>
+            <a:r>
+              <a:rPr lang="en-US" sz="2400" b="1" dirty="0" smtClean="0"/>
+              <a:t> </a:t>
+            </a:r>
+            <a:r>
+              <a:rPr lang="en-US" sz="2400" b="1" i="1" dirty="0" err="1" smtClean="0"/>
+              <a:t>k</a:t>
+            </a:r>
+            <a:r>
+              <a:rPr lang="en-US" sz="2400" b="1" i="1" baseline="-25000" dirty="0" err="1" smtClean="0"/>
+              <a:t>i</a:t>
+            </a:r>
+            <a:r>
+              <a:rPr lang="en-US" sz="2400" b="1" i="1" dirty="0" smtClean="0"/>
+              <a:t> </a:t>
+            </a:r>
+            <a:r>
+              <a:rPr lang="en-US" sz="2400" b="1" dirty="0" smtClean="0"/>
+              <a:t>/ </a:t>
+            </a:r>
+            <a:r>
+              <a:rPr lang="en-US" sz="2400" b="1" dirty="0" err="1"/>
+              <a:t>Σ</a:t>
+            </a:r>
+            <a:r>
+              <a:rPr lang="en-US" sz="2400" b="1" i="1" baseline="-25000" dirty="0" err="1"/>
+              <a:t>i</a:t>
+            </a:r>
+            <a:r>
+              <a:rPr lang="en-US" sz="2400" b="1" dirty="0"/>
+              <a:t> </a:t>
+            </a:r>
+            <a:r>
+              <a:rPr lang="en-US" sz="2400" b="1" i="1" dirty="0" smtClean="0"/>
+              <a:t>m</a:t>
+            </a:r>
+            <a:r>
+              <a:rPr lang="en-US" sz="2400" b="1" i="1" baseline="-25000" dirty="0" smtClean="0"/>
+              <a:t>i</a:t>
+            </a:r>
+            <a:r>
+              <a:rPr lang="en-US" sz="2400" b="1" dirty="0" smtClean="0"/>
+              <a:t> </a:t>
+            </a:r>
+          </a:p>
+          <a:p>
+            <a:r>
+              <a:rPr lang="en-US" sz="2400" b="1" dirty="0" smtClean="0"/>
+              <a:t>Recall = </a:t>
+            </a:r>
+            <a:r>
+              <a:rPr lang="en-US" sz="2400" b="1" dirty="0" err="1"/>
+              <a:t>Σ</a:t>
+            </a:r>
+            <a:r>
+              <a:rPr lang="en-US" sz="2400" b="1" i="1" baseline="-25000" dirty="0" err="1"/>
+              <a:t>i</a:t>
+            </a:r>
+            <a:r>
+              <a:rPr lang="en-US" sz="2400" b="1" dirty="0"/>
+              <a:t> </a:t>
+            </a:r>
+            <a:r>
+              <a:rPr lang="en-US" sz="2400" b="1" i="1" dirty="0" err="1" smtClean="0"/>
+              <a:t>k</a:t>
+            </a:r>
+            <a:r>
+              <a:rPr lang="en-US" sz="2400" b="1" i="1" baseline="-25000" dirty="0" err="1" smtClean="0"/>
+              <a:t>i</a:t>
+            </a:r>
+            <a:r>
+              <a:rPr lang="en-US" sz="2400" b="1" i="1" dirty="0" smtClean="0"/>
+              <a:t> </a:t>
+            </a:r>
+            <a:r>
+              <a:rPr lang="en-US" sz="2400" b="1" dirty="0" smtClean="0"/>
+              <a:t>/ </a:t>
+            </a:r>
+            <a:r>
+              <a:rPr lang="en-US" sz="2400" b="1" dirty="0" err="1"/>
+              <a:t>Σ</a:t>
+            </a:r>
+            <a:r>
+              <a:rPr lang="en-US" sz="2400" b="1" i="1" baseline="-25000" dirty="0" err="1"/>
+              <a:t>i</a:t>
+            </a:r>
+            <a:r>
+              <a:rPr lang="en-US" sz="2400" b="1" dirty="0"/>
+              <a:t> </a:t>
+            </a:r>
+            <a:r>
+              <a:rPr lang="en-US" sz="2400" b="1" i="1" dirty="0" err="1" smtClean="0"/>
+              <a:t>n</a:t>
+            </a:r>
+            <a:r>
+              <a:rPr lang="en-US" sz="2400" b="1" i="1" baseline="-25000" dirty="0" err="1" smtClean="0"/>
+              <a:t>i</a:t>
+            </a:r>
+            <a:endParaRPr lang="en-US" sz="2400" b="1" dirty="0"/>
           </a:p>
         </p:txBody>
       </p:sp>

</xml_diff>